<commit_message>
update cheatsheet for github
</commit_message>
<xml_diff>
--- a/content/building-blocks/collaborate-and-share-your-work/use-github/github_cheatsheet_tsh.pptx
+++ b/content/building-blocks/collaborate-and-share-your-work/use-github/github_cheatsheet_tsh.pptx
@@ -205,7 +205,7 @@
           <a:p>
             <a:fld id="{B2673ADC-D0E9-8447-A5F0-07DF81F0DDC8}" type="datetimeFigureOut">
               <a:rPr lang="en-NL" smtClean="0"/>
-              <a:t>08/09/2022</a:t>
+              <a:t>05/09/2023</a:t>
             </a:fld>
             <a:endParaRPr lang="en-NL"/>
           </a:p>
@@ -3570,7 +3570,7 @@
         </p:blipFill>
         <p:spPr>
           <a:xfrm>
-            <a:off x="-4249968" y="-281206"/>
+            <a:off x="-3832409" y="-96406"/>
             <a:ext cx="17009059" cy="9347200"/>
           </a:xfrm>
           <a:prstGeom prst="rect">
@@ -3592,8 +3592,8 @@
         </p:nvSpPr>
         <p:spPr>
           <a:xfrm rot="10800000" flipH="1">
-            <a:off x="2674780" y="5362271"/>
-            <a:ext cx="2656338" cy="1028629"/>
+            <a:off x="2674780" y="5362270"/>
+            <a:ext cx="2656338" cy="1209518"/>
           </a:xfrm>
           <a:prstGeom prst="snip1Rect">
             <a:avLst/>
@@ -3646,7 +3646,7 @@
         </p:nvSpPr>
         <p:spPr>
           <a:xfrm>
-            <a:off x="1164402" y="1273576"/>
+            <a:off x="1087862" y="1273576"/>
             <a:ext cx="476790" cy="601520"/>
           </a:xfrm>
           <a:prstGeom prst="can">
@@ -3911,7 +3911,7 @@
                 </a:solidFill>
                 <a:latin typeface="Acumin Pro" panose="020B0504020202020204" pitchFamily="34" charset="0"/>
               </a:rPr>
-              <a:t>Ideally, use a the template to start.</a:t>
+              <a:t>Ideally, use a repository template to start.</a:t>
             </a:r>
             <a:endParaRPr lang="nl-NL" sz="800" b="0" strike="noStrike" spc="-1" dirty="0">
               <a:latin typeface="Acumin Pro" panose="020B0504020202020204" pitchFamily="34" charset="0"/>
@@ -3928,7 +3928,7 @@
         <p:spPr>
           <a:xfrm>
             <a:off x="686131" y="1911894"/>
-            <a:ext cx="1511640" cy="213990"/>
+            <a:ext cx="1280252" cy="213990"/>
           </a:xfrm>
           <a:prstGeom prst="rect">
             <a:avLst/>
@@ -3956,7 +3956,7 @@
           </a:bodyPr>
           <a:lstStyle/>
           <a:p>
-            <a:pPr>
+            <a:pPr algn="ctr">
               <a:lnSpc>
                 <a:spcPct val="100000"/>
               </a:lnSpc>
@@ -4362,8 +4362,8 @@
         </p:nvSpPr>
         <p:spPr>
           <a:xfrm>
-            <a:off x="4015577" y="349517"/>
-            <a:ext cx="2207119" cy="460211"/>
+            <a:off x="4015577" y="286211"/>
+            <a:ext cx="2207119" cy="583321"/>
           </a:xfrm>
           <a:prstGeom prst="rect">
             <a:avLst/>
@@ -4442,7 +4442,25 @@
                 </a:solidFill>
                 <a:latin typeface="Acumin Pro" panose="020B0504020202020204" pitchFamily="34" charset="0"/>
               </a:rPr>
-              <a:t>Team members fork (=copy) the repository to their own GitHub account.</a:t>
+              <a:t>Team members fork (=copy) the repository to their </a:t>
+            </a:r>
+            <a:r>
+              <a:rPr lang="en-US" sz="800" b="0" i="1" strike="noStrike" spc="-1" dirty="0">
+                <a:solidFill>
+                  <a:srgbClr val="000000"/>
+                </a:solidFill>
+                <a:latin typeface="Acumin Pro" panose="020B0504020202020204" pitchFamily="34" charset="0"/>
+              </a:rPr>
+              <a:t>own</a:t>
+            </a:r>
+            <a:r>
+              <a:rPr lang="en-US" sz="800" b="0" strike="noStrike" spc="-1" dirty="0">
+                <a:solidFill>
+                  <a:srgbClr val="000000"/>
+                </a:solidFill>
+                <a:latin typeface="Acumin Pro" panose="020B0504020202020204" pitchFamily="34" charset="0"/>
+              </a:rPr>
+              <a:t> GitHub account. The fork can be synchronized with its origin.</a:t>
             </a:r>
             <a:endParaRPr lang="nl-NL" sz="800" b="0" strike="noStrike" spc="-1" dirty="0">
               <a:latin typeface="Acumin Pro" panose="020B0504020202020204" pitchFamily="34" charset="0"/>
@@ -4464,7 +4482,7 @@
         </p:nvGrpSpPr>
         <p:grpSpPr>
           <a:xfrm>
-            <a:off x="7327258" y="2927411"/>
+            <a:off x="7327258" y="3004785"/>
             <a:ext cx="1574768" cy="593598"/>
             <a:chOff x="7193655" y="3286561"/>
             <a:chExt cx="1574768" cy="593598"/>
@@ -4573,27 +4591,27 @@
                 </a:lnSpc>
               </a:pPr>
               <a:r>
-                <a:rPr lang="en-US" sz="700" dirty="0">
+                <a:rPr lang="en-US" sz="700" b="1" dirty="0">
                   <a:latin typeface="Roboto Mono Light" panose="00000009000000000000" pitchFamily="49" charset="0"/>
                   <a:ea typeface="Roboto Mono Light" panose="00000009000000000000" pitchFamily="49" charset="0"/>
                 </a:rPr>
                 <a:t>git clone [owner </a:t>
               </a:r>
               <a:r>
-                <a:rPr lang="en-US" sz="700" dirty="0" err="1">
+                <a:rPr lang="en-US" sz="700" b="1" dirty="0" err="1">
                   <a:latin typeface="Roboto Mono Light" panose="00000009000000000000" pitchFamily="49" charset="0"/>
                   <a:ea typeface="Roboto Mono Light" panose="00000009000000000000" pitchFamily="49" charset="0"/>
                 </a:rPr>
                 <a:t>url</a:t>
               </a:r>
               <a:r>
-                <a:rPr lang="en-US" sz="700" dirty="0">
+                <a:rPr lang="en-US" sz="700" b="1" dirty="0">
                   <a:latin typeface="Roboto Mono Light" panose="00000009000000000000" pitchFamily="49" charset="0"/>
                   <a:ea typeface="Roboto Mono Light" panose="00000009000000000000" pitchFamily="49" charset="0"/>
                 </a:rPr>
                 <a:t>]</a:t>
               </a:r>
-              <a:endParaRPr lang="nl-NL" sz="700" dirty="0">
+              <a:endParaRPr lang="nl-NL" sz="700" b="1" dirty="0">
                 <a:latin typeface="Roboto Mono Light" panose="00000009000000000000" pitchFamily="49" charset="0"/>
                 <a:ea typeface="Roboto Mono Light" panose="00000009000000000000" pitchFamily="49" charset="0"/>
               </a:endParaRPr>
@@ -4677,8 +4695,8 @@
         </p:nvSpPr>
         <p:spPr>
           <a:xfrm>
-            <a:off x="9533286" y="626674"/>
-            <a:ext cx="2125273" cy="829543"/>
+            <a:off x="10165856" y="1405377"/>
+            <a:ext cx="1833304" cy="1321985"/>
           </a:xfrm>
           <a:prstGeom prst="rect">
             <a:avLst/>
@@ -4720,7 +4738,7 @@
                 </a:solidFill>
                 <a:latin typeface="Acumin Pro" panose="020B0504020202020204" pitchFamily="34" charset="0"/>
               </a:rPr>
-              <a:t>5a) Review Pull Request and </a:t>
+              <a:t>5) Review Pull Request and </a:t>
             </a:r>
             <a:r>
               <a:rPr lang="en-US" sz="800" b="1" spc="-1" dirty="0">
@@ -4745,73 +4763,45 @@
               </a:lnSpc>
             </a:pPr>
             <a:r>
-              <a:rPr lang="en-US" sz="800" strike="noStrike" spc="-1" dirty="0">
-                <a:solidFill>
-                  <a:srgbClr val="000000"/>
-                </a:solidFill>
-                <a:latin typeface="Acumin Pro" panose="020B0504020202020204" pitchFamily="34" charset="0"/>
-              </a:rPr>
-              <a:t>Changes at this point are only visible in the local repository. Go to the Pull Requests tab, and review submitted requests. Finally, merge them into your main project, and close the corresponding issue. </a:t>
-            </a:r>
-            <a:endParaRPr lang="nl-NL" sz="800" b="0" strike="noStrike" spc="-1" dirty="0">
-              <a:latin typeface="Acumin Pro" panose="020B0504020202020204" pitchFamily="34" charset="0"/>
-            </a:endParaRPr>
-          </a:p>
-        </p:txBody>
-      </p:sp>
-      <p:sp>
-        <p:nvSpPr>
-          <p:cNvPr id="170" name="CustomShape 34"/>
-          <p:cNvSpPr/>
-          <p:nvPr/>
-        </p:nvSpPr>
-        <p:spPr>
-          <a:xfrm>
-            <a:off x="9772912" y="2417224"/>
-            <a:ext cx="1723015" cy="706432"/>
-          </a:xfrm>
-          <a:prstGeom prst="rect">
-            <a:avLst/>
-          </a:prstGeom>
-          <a:solidFill>
-            <a:schemeClr val="bg1"/>
-          </a:solidFill>
-          <a:ln>
-            <a:noFill/>
-          </a:ln>
-        </p:spPr>
-        <p:style>
-          <a:lnRef idx="0">
-            <a:scrgbClr r="0" g="0" b="0"/>
-          </a:lnRef>
-          <a:fillRef idx="0">
-            <a:scrgbClr r="0" g="0" b="0"/>
-          </a:fillRef>
-          <a:effectRef idx="0">
-            <a:scrgbClr r="0" g="0" b="0"/>
-          </a:effectRef>
-          <a:fontRef idx="minor"/>
-        </p:style>
-        <p:txBody>
-          <a:bodyPr wrap="square" lIns="90000" tIns="45000" rIns="90000" bIns="45000">
-            <a:spAutoFit/>
-          </a:bodyPr>
-          <a:lstStyle/>
+              <a:rPr lang="en-US" sz="800" spc="-1" dirty="0">
+                <a:solidFill>
+                  <a:srgbClr val="000000"/>
+                </a:solidFill>
+                <a:latin typeface="Acumin Pro" panose="020B0504020202020204" pitchFamily="34" charset="0"/>
+              </a:rPr>
+              <a:t>Team members make </a:t>
+            </a:r>
+            <a:r>
+              <a:rPr lang="en-US" sz="800" b="1" spc="-1" dirty="0">
+                <a:solidFill>
+                  <a:srgbClr val="000000"/>
+                </a:solidFill>
+                <a:latin typeface="Acumin Pro" panose="020B0504020202020204" pitchFamily="34" charset="0"/>
+              </a:rPr>
+              <a:t>pull requests </a:t>
+            </a:r>
+            <a:r>
+              <a:rPr lang="en-US" sz="800" spc="-1" dirty="0">
+                <a:solidFill>
+                  <a:srgbClr val="000000"/>
+                </a:solidFill>
+                <a:latin typeface="Acumin Pro" panose="020B0504020202020204" pitchFamily="34" charset="0"/>
+              </a:rPr>
+              <a:t>to ask for code changes to be integrated in the main project. </a:t>
+            </a:r>
+          </a:p>
           <a:p>
             <a:pPr>
               <a:lnSpc>
                 <a:spcPct val="100000"/>
               </a:lnSpc>
             </a:pPr>
-            <a:r>
-              <a:rPr lang="en-US" sz="800" b="1" strike="noStrike" spc="-1" dirty="0">
-                <a:solidFill>
-                  <a:srgbClr val="000000"/>
-                </a:solidFill>
-                <a:latin typeface="Acumin Pro" panose="020B0504020202020204" pitchFamily="34" charset="0"/>
-              </a:rPr>
-              <a:t>5b) Close Issue</a:t>
-            </a:r>
+            <a:endParaRPr lang="en-US" sz="800" spc="-1" dirty="0">
+              <a:solidFill>
+                <a:srgbClr val="000000"/>
+              </a:solidFill>
+              <a:latin typeface="Acumin Pro" panose="020B0504020202020204" pitchFamily="34" charset="0"/>
+            </a:endParaRPr>
           </a:p>
           <a:p>
             <a:pPr>
@@ -4820,22 +4810,22 @@
               </a:lnSpc>
             </a:pPr>
             <a:r>
+              <a:rPr lang="en-US" sz="800" spc="-1" dirty="0">
+                <a:solidFill>
+                  <a:srgbClr val="000000"/>
+                </a:solidFill>
+                <a:latin typeface="Acumin Pro" panose="020B0504020202020204" pitchFamily="34" charset="0"/>
+              </a:rPr>
+              <a:t>To review and accept these requests, go </a:t>
+            </a:r>
+            <a:r>
               <a:rPr lang="en-US" sz="800" strike="noStrike" spc="-1" dirty="0">
                 <a:solidFill>
                   <a:srgbClr val="000000"/>
                 </a:solidFill>
                 <a:latin typeface="Acumin Pro" panose="020B0504020202020204" pitchFamily="34" charset="0"/>
               </a:rPr>
-              <a:t>Since you work in the owner’s </a:t>
-            </a:r>
-            <a:r>
-              <a:rPr lang="en-US" sz="800" b="0" strike="noStrike" spc="-1" dirty="0">
-                <a:solidFill>
-                  <a:srgbClr val="000000"/>
-                </a:solidFill>
-                <a:latin typeface="Acumin Pro" panose="020B0504020202020204" pitchFamily="34" charset="0"/>
-              </a:rPr>
-              <a:t>repository, all changes are already visible online. Close the corresponding issue.</a:t>
+              <a:t>to the Pull Requests tab, and review submitted requests. Finally, merge them into your original project, and close the corresponding issue. </a:t>
             </a:r>
             <a:endParaRPr lang="nl-NL" sz="800" b="0" strike="noStrike" spc="-1" dirty="0">
               <a:latin typeface="Acumin Pro" panose="020B0504020202020204" pitchFamily="34" charset="0"/>
@@ -4903,10 +4893,10 @@
         </p:nvGrpSpPr>
         <p:grpSpPr>
           <a:xfrm>
-            <a:off x="3913382" y="1046940"/>
-            <a:ext cx="7488790" cy="1464523"/>
-            <a:chOff x="3663011" y="984347"/>
-            <a:chExt cx="7488790" cy="1464523"/>
+            <a:off x="4137236" y="1046940"/>
+            <a:ext cx="7264936" cy="1464523"/>
+            <a:chOff x="3886865" y="984347"/>
+            <a:chExt cx="7264936" cy="1464523"/>
           </a:xfrm>
         </p:grpSpPr>
         <p:sp>
@@ -4995,8 +4985,8 @@
           </p:nvSpPr>
           <p:spPr>
             <a:xfrm>
-              <a:off x="3663011" y="1877827"/>
-              <a:ext cx="6095520" cy="213990"/>
+              <a:off x="3886865" y="1935594"/>
+              <a:ext cx="1304423" cy="213990"/>
             </a:xfrm>
             <a:prstGeom prst="rect">
               <a:avLst/>
@@ -5019,7 +5009,7 @@
             <a:fontRef idx="minor"/>
           </p:style>
           <p:txBody>
-            <a:bodyPr lIns="90000" tIns="45000" rIns="90000" bIns="45000">
+            <a:bodyPr wrap="square" lIns="90000" tIns="45000" rIns="90000" bIns="45000">
               <a:spAutoFit/>
             </a:bodyPr>
             <a:lstStyle/>
@@ -6000,8 +5990,8 @@
         </p:nvSpPr>
         <p:spPr>
           <a:xfrm>
-            <a:off x="2674058" y="5355626"/>
-            <a:ext cx="2632594" cy="1077218"/>
+            <a:off x="2674058" y="5404864"/>
+            <a:ext cx="2632594" cy="1200329"/>
           </a:xfrm>
           <a:prstGeom prst="rect">
             <a:avLst/>
@@ -6029,7 +6019,7 @@
                 <a:solidFill>
                   <a:srgbClr val="000000"/>
                 </a:solidFill>
-                <a:latin typeface="Acumin Pro" panose="020B0504020202020204" pitchFamily="34" charset="0"/>
+                <a:latin typeface="Lucida Console" panose="020B0609040504020204" pitchFamily="49" charset="0"/>
               </a:rPr>
               <a:t>git branch {name} </a:t>
             </a:r>
@@ -6120,7 +6110,7 @@
                 <a:solidFill>
                   <a:srgbClr val="000000"/>
                 </a:solidFill>
-                <a:latin typeface="Acumin Pro" panose="020B0504020202020204" pitchFamily="34" charset="0"/>
+                <a:latin typeface="Lucida Console" panose="020B0609040504020204" pitchFamily="49" charset="0"/>
               </a:rPr>
               <a:t>git checkout {name} </a:t>
             </a:r>
@@ -6218,14 +6208,14 @@
                 <a:latin typeface="Acumin Pro" panose="020B0504020202020204" pitchFamily="34" charset="0"/>
                 <a:cs typeface="Calibri" panose="020F0502020204030204" pitchFamily="34" charset="0"/>
               </a:rPr>
-              <a:t>In the future, use </a:t>
+              <a:t>Use </a:t>
             </a:r>
             <a:r>
               <a:rPr lang="en-US" sz="800" b="0" strike="noStrike" spc="-1" dirty="0">
                 <a:solidFill>
                   <a:srgbClr val="000000"/>
                 </a:solidFill>
-                <a:latin typeface="Acumin Pro" panose="020B0504020202020204" pitchFamily="34" charset="0"/>
+                <a:latin typeface="Lucida Console" panose="020B0609040504020204" pitchFamily="49" charset="0"/>
               </a:rPr>
               <a:t>git pull {name} </a:t>
             </a:r>
@@ -6261,7 +6251,7 @@
         <p:spPr>
           <a:xfrm>
             <a:off x="5523208" y="6086598"/>
-            <a:ext cx="2227867" cy="523220"/>
+            <a:ext cx="2227867" cy="630942"/>
           </a:xfrm>
           <a:prstGeom prst="rect">
             <a:avLst/>
@@ -6295,12 +6285,24 @@
               <a:rPr lang="nl-NL" sz="700" spc="-1" dirty="0">
                 <a:latin typeface="Acumin Pro" panose="020B0504020202020204" pitchFamily="34" charset="0"/>
               </a:rPr>
-              <a:t> command uploads the contents of </a:t>
+              <a:t> command uploads </a:t>
             </a:r>
             <a:r>
               <a:rPr lang="nl-NL" sz="700" spc="-1" dirty="0" err="1">
                 <a:latin typeface="Acumin Pro" panose="020B0504020202020204" pitchFamily="34" charset="0"/>
               </a:rPr>
+              <a:t>the</a:t>
+            </a:r>
+            <a:r>
+              <a:rPr lang="nl-NL" sz="700" spc="-1" dirty="0">
+                <a:latin typeface="Acumin Pro" panose="020B0504020202020204" pitchFamily="34" charset="0"/>
+              </a:rPr>
+              <a:t> content of </a:t>
+            </a:r>
+            <a:r>
+              <a:rPr lang="nl-NL" sz="700" spc="-1" dirty="0" err="1">
+                <a:latin typeface="Acumin Pro" panose="020B0504020202020204" pitchFamily="34" charset="0"/>
+              </a:rPr>
               <a:t>your</a:t>
             </a:r>
             <a:r>
@@ -6319,25 +6321,25 @@
               <a:rPr lang="nl-NL" sz="700" spc="-1" dirty="0">
                 <a:latin typeface="Acumin Pro" panose="020B0504020202020204" pitchFamily="34" charset="0"/>
               </a:rPr>
-              <a:t> repository to a remote repository on </a:t>
+              <a:t> repository to a remote repository on GitHub. </a:t>
             </a:r>
             <a:r>
               <a:rPr lang="nl-NL" sz="700" spc="-1" dirty="0" err="1">
                 <a:latin typeface="Acumin Pro" panose="020B0504020202020204" pitchFamily="34" charset="0"/>
               </a:rPr>
-              <a:t>Github</a:t>
+              <a:t>Your</a:t>
             </a:r>
             <a:r>
               <a:rPr lang="nl-NL" sz="700" spc="-1" dirty="0">
                 <a:latin typeface="Acumin Pro" panose="020B0504020202020204" pitchFamily="34" charset="0"/>
               </a:rPr>
-              <a:t>! </a:t>
+              <a:t> team members </a:t>
             </a:r>
             <a:r>
               <a:rPr lang="nl-NL" sz="700" spc="-1" dirty="0" err="1">
                 <a:latin typeface="Acumin Pro" panose="020B0504020202020204" pitchFamily="34" charset="0"/>
               </a:rPr>
-              <a:t>If</a:t>
+              <a:t>will</a:t>
             </a:r>
             <a:r>
               <a:rPr lang="nl-NL" sz="700" spc="-1" dirty="0">
@@ -6349,121 +6351,145 @@
               <a:rPr lang="nl-NL" sz="700" spc="-1" dirty="0" err="1">
                 <a:latin typeface="Acumin Pro" panose="020B0504020202020204" pitchFamily="34" charset="0"/>
               </a:rPr>
-              <a:t>you</a:t>
+              <a:t>likely</a:t>
             </a:r>
             <a:r>
               <a:rPr lang="nl-NL" sz="700" spc="-1" dirty="0">
                 <a:latin typeface="Acumin Pro" panose="020B0504020202020204" pitchFamily="34" charset="0"/>
               </a:rPr>
-              <a:t> are </a:t>
+              <a:t> </a:t>
             </a:r>
             <a:r>
               <a:rPr lang="nl-NL" sz="700" spc="-1" dirty="0" err="1">
                 <a:latin typeface="Acumin Pro" panose="020B0504020202020204" pitchFamily="34" charset="0"/>
               </a:rPr>
-              <a:t>working</a:t>
+              <a:t>not</a:t>
             </a:r>
             <a:r>
               <a:rPr lang="nl-NL" sz="700" spc="-1" dirty="0">
                 <a:latin typeface="Acumin Pro" panose="020B0504020202020204" pitchFamily="34" charset="0"/>
               </a:rPr>
-              <a:t> on a </a:t>
+              <a:t> </a:t>
             </a:r>
             <a:r>
               <a:rPr lang="nl-NL" sz="700" spc="-1" dirty="0" err="1">
                 <a:latin typeface="Acumin Pro" panose="020B0504020202020204" pitchFamily="34" charset="0"/>
               </a:rPr>
+              <a:t>see</a:t>
+            </a:r>
+            <a:r>
+              <a:rPr lang="nl-NL" sz="700" spc="-1" dirty="0">
+                <a:latin typeface="Acumin Pro" panose="020B0504020202020204" pitchFamily="34" charset="0"/>
+              </a:rPr>
+              <a:t> these changes </a:t>
+            </a:r>
+            <a:r>
+              <a:rPr lang="nl-NL" sz="700" spc="-1" dirty="0" err="1">
+                <a:latin typeface="Acumin Pro" panose="020B0504020202020204" pitchFamily="34" charset="0"/>
+              </a:rPr>
+              <a:t>yet</a:t>
+            </a:r>
+            <a:r>
+              <a:rPr lang="nl-NL" sz="700" spc="-1" dirty="0">
+                <a:latin typeface="Acumin Pro" panose="020B0504020202020204" pitchFamily="34" charset="0"/>
+              </a:rPr>
+              <a:t> (e.g., </a:t>
+            </a:r>
+            <a:r>
+              <a:rPr lang="nl-NL" sz="700" spc="-1" dirty="0" err="1">
+                <a:latin typeface="Acumin Pro" panose="020B0504020202020204" pitchFamily="34" charset="0"/>
+              </a:rPr>
+              <a:t>because</a:t>
+            </a:r>
+            <a:r>
+              <a:rPr lang="nl-NL" sz="700" spc="-1" dirty="0">
+                <a:latin typeface="Acumin Pro" panose="020B0504020202020204" pitchFamily="34" charset="0"/>
+              </a:rPr>
+              <a:t> </a:t>
+            </a:r>
+            <a:r>
+              <a:rPr lang="nl-NL" sz="700" spc="-1" dirty="0" err="1">
+                <a:latin typeface="Acumin Pro" panose="020B0504020202020204" pitchFamily="34" charset="0"/>
+              </a:rPr>
+              <a:t>they</a:t>
+            </a:r>
+            <a:r>
+              <a:rPr lang="nl-NL" sz="700" spc="-1" dirty="0">
+                <a:latin typeface="Acumin Pro" panose="020B0504020202020204" pitchFamily="34" charset="0"/>
+              </a:rPr>
+              <a:t> </a:t>
+            </a:r>
+            <a:r>
+              <a:rPr lang="nl-NL" sz="700" spc="-1" dirty="0" err="1">
+                <a:latin typeface="Acumin Pro" panose="020B0504020202020204" pitchFamily="34" charset="0"/>
+              </a:rPr>
+              <a:t>don’t</a:t>
+            </a:r>
+            <a:r>
+              <a:rPr lang="nl-NL" sz="700" spc="-1" dirty="0">
+                <a:latin typeface="Acumin Pro" panose="020B0504020202020204" pitchFamily="34" charset="0"/>
+              </a:rPr>
+              <a:t> monitor </a:t>
+            </a:r>
+            <a:r>
+              <a:rPr lang="nl-NL" sz="700" spc="-1" dirty="0" err="1">
+                <a:latin typeface="Acumin Pro" panose="020B0504020202020204" pitchFamily="34" charset="0"/>
+              </a:rPr>
+              <a:t>the</a:t>
+            </a:r>
+            <a:r>
+              <a:rPr lang="nl-NL" sz="700" spc="-1" dirty="0">
+                <a:latin typeface="Acumin Pro" panose="020B0504020202020204" pitchFamily="34" charset="0"/>
+              </a:rPr>
+              <a:t> </a:t>
+            </a:r>
+            <a:r>
+              <a:rPr lang="nl-NL" sz="700" spc="-1" dirty="0" err="1">
+                <a:latin typeface="Acumin Pro" panose="020B0504020202020204" pitchFamily="34" charset="0"/>
+              </a:rPr>
+              <a:t>branch</a:t>
+            </a:r>
+            <a:r>
+              <a:rPr lang="nl-NL" sz="700" spc="-1" dirty="0">
+                <a:latin typeface="Acumin Pro" panose="020B0504020202020204" pitchFamily="34" charset="0"/>
+              </a:rPr>
+              <a:t>, or </a:t>
+            </a:r>
+            <a:r>
+              <a:rPr lang="nl-NL" sz="700" spc="-1" dirty="0" err="1">
+                <a:latin typeface="Acumin Pro" panose="020B0504020202020204" pitchFamily="34" charset="0"/>
+              </a:rPr>
+              <a:t>because</a:t>
+            </a:r>
+            <a:r>
+              <a:rPr lang="nl-NL" sz="700" spc="-1" dirty="0">
+                <a:latin typeface="Acumin Pro" panose="020B0504020202020204" pitchFamily="34" charset="0"/>
+              </a:rPr>
+              <a:t> </a:t>
+            </a:r>
+            <a:r>
+              <a:rPr lang="nl-NL" sz="700" spc="-1" dirty="0" err="1">
+                <a:latin typeface="Acumin Pro" panose="020B0504020202020204" pitchFamily="34" charset="0"/>
+              </a:rPr>
+              <a:t>the</a:t>
+            </a:r>
+            <a:r>
+              <a:rPr lang="nl-NL" sz="700" spc="-1" dirty="0">
+                <a:latin typeface="Acumin Pro" panose="020B0504020202020204" pitchFamily="34" charset="0"/>
+              </a:rPr>
+              <a:t> changes are in a </a:t>
+            </a:r>
+            <a:r>
+              <a:rPr lang="nl-NL" sz="700" spc="-1" dirty="0" err="1">
+                <a:latin typeface="Acumin Pro" panose="020B0504020202020204" pitchFamily="34" charset="0"/>
+              </a:rPr>
               <a:t>fork</a:t>
             </a:r>
             <a:r>
               <a:rPr lang="nl-NL" sz="700" spc="-1" dirty="0">
                 <a:latin typeface="Acumin Pro" panose="020B0504020202020204" pitchFamily="34" charset="0"/>
               </a:rPr>
-              <a:t>, </a:t>
-            </a:r>
-            <a:r>
-              <a:rPr lang="nl-NL" sz="700" spc="-1" dirty="0" err="1">
-                <a:latin typeface="Acumin Pro" panose="020B0504020202020204" pitchFamily="34" charset="0"/>
-              </a:rPr>
-              <a:t>your</a:t>
-            </a:r>
-            <a:r>
-              <a:rPr lang="nl-NL" sz="700" spc="-1" dirty="0">
-                <a:latin typeface="Acumin Pro" panose="020B0504020202020204" pitchFamily="34" charset="0"/>
-              </a:rPr>
-              <a:t> team members </a:t>
-            </a:r>
-            <a:r>
-              <a:rPr lang="nl-NL" sz="700" spc="-1" dirty="0" err="1">
-                <a:latin typeface="Acumin Pro" panose="020B0504020202020204" pitchFamily="34" charset="0"/>
-              </a:rPr>
-              <a:t>won’t</a:t>
-            </a:r>
-            <a:r>
-              <a:rPr lang="nl-NL" sz="700" spc="-1" dirty="0">
-                <a:latin typeface="Acumin Pro" panose="020B0504020202020204" pitchFamily="34" charset="0"/>
-              </a:rPr>
-              <a:t> </a:t>
-            </a:r>
-            <a:r>
-              <a:rPr lang="nl-NL" sz="700" spc="-1" dirty="0" err="1">
-                <a:latin typeface="Acumin Pro" panose="020B0504020202020204" pitchFamily="34" charset="0"/>
-              </a:rPr>
-              <a:t>be</a:t>
-            </a:r>
-            <a:r>
-              <a:rPr lang="nl-NL" sz="700" spc="-1" dirty="0">
-                <a:latin typeface="Acumin Pro" panose="020B0504020202020204" pitchFamily="34" charset="0"/>
-              </a:rPr>
-              <a:t> </a:t>
-            </a:r>
-            <a:r>
-              <a:rPr lang="nl-NL" sz="700" spc="-1" dirty="0" err="1">
-                <a:latin typeface="Acumin Pro" panose="020B0504020202020204" pitchFamily="34" charset="0"/>
-              </a:rPr>
-              <a:t>able</a:t>
-            </a:r>
-            <a:r>
-              <a:rPr lang="nl-NL" sz="700" spc="-1" dirty="0">
-                <a:latin typeface="Acumin Pro" panose="020B0504020202020204" pitchFamily="34" charset="0"/>
-              </a:rPr>
-              <a:t> </a:t>
-            </a:r>
-            <a:r>
-              <a:rPr lang="nl-NL" sz="700" spc="-1" dirty="0" err="1">
-                <a:latin typeface="Acumin Pro" panose="020B0504020202020204" pitchFamily="34" charset="0"/>
-              </a:rPr>
-              <a:t>to</a:t>
-            </a:r>
-            <a:r>
-              <a:rPr lang="nl-NL" sz="700" spc="-1" dirty="0">
-                <a:latin typeface="Acumin Pro" panose="020B0504020202020204" pitchFamily="34" charset="0"/>
-              </a:rPr>
-              <a:t> </a:t>
-            </a:r>
-            <a:r>
-              <a:rPr lang="nl-NL" sz="700" spc="-1" dirty="0" err="1">
-                <a:latin typeface="Acumin Pro" panose="020B0504020202020204" pitchFamily="34" charset="0"/>
-              </a:rPr>
-              <a:t>see</a:t>
-            </a:r>
-            <a:r>
-              <a:rPr lang="nl-NL" sz="700" spc="-1" dirty="0">
-                <a:latin typeface="Acumin Pro" panose="020B0504020202020204" pitchFamily="34" charset="0"/>
-              </a:rPr>
-              <a:t> these changes </a:t>
-            </a:r>
-            <a:r>
-              <a:rPr lang="nl-NL" sz="700" spc="-1" dirty="0" err="1">
-                <a:latin typeface="Acumin Pro" panose="020B0504020202020204" pitchFamily="34" charset="0"/>
-              </a:rPr>
-              <a:t>yet</a:t>
-            </a:r>
-            <a:r>
-              <a:rPr lang="nl-NL" sz="700" spc="-1" dirty="0">
-                <a:latin typeface="Acumin Pro" panose="020B0504020202020204" pitchFamily="34" charset="0"/>
-              </a:rPr>
-              <a:t>.</a:t>
+              <a:t>).</a:t>
             </a:r>
             <a:endParaRPr lang="nl-NL" sz="700" b="0" strike="noStrike" spc="-1" dirty="0">
               <a:latin typeface="Acumin Pro" panose="020B0504020202020204" pitchFamily="34" charset="0"/>
@@ -6663,7 +6689,7 @@
         </p:nvCxnSpPr>
         <p:spPr>
           <a:xfrm>
-            <a:off x="6222696" y="664747"/>
+            <a:off x="6222696" y="608475"/>
             <a:ext cx="547399" cy="0"/>
           </a:xfrm>
           <a:prstGeom prst="straightConnector1">
@@ -6751,7 +6777,7 @@
                 </a:solidFill>
                 <a:latin typeface="Acumin Pro" panose="020B0504020202020204" pitchFamily="34" charset="0"/>
               </a:rPr>
-              <a:t>Next, decide on whether to </a:t>
+              <a:t>Choose to </a:t>
             </a:r>
             <a:r>
               <a:rPr lang="en-US" sz="800" spc="-1" dirty="0">
@@ -6760,7 +6786,7 @@
                 </a:solidFill>
                 <a:latin typeface="Acumin Pro" panose="020B0504020202020204" pitchFamily="34" charset="0"/>
               </a:rPr>
-              <a:t>work privately (e.g., for confidential projects), or publicly (e.g., for open-source projects)</a:t>
+              <a:t>work privately (e.g., for confidential projects), or publicly (e.g., for open-source projects other can contribute to)</a:t>
             </a:r>
             <a:endParaRPr lang="nl-NL" sz="800" b="0" strike="noStrike" spc="-1" dirty="0">
               <a:latin typeface="Acumin Pro" panose="020B0504020202020204" pitchFamily="34" charset="0"/>
@@ -6784,7 +6810,7 @@
         </p:nvCxnSpPr>
         <p:spPr>
           <a:xfrm flipV="1">
-            <a:off x="8772925" y="2171215"/>
+            <a:off x="8767778" y="2259997"/>
             <a:ext cx="533348" cy="552752"/>
           </a:xfrm>
           <a:prstGeom prst="straightConnector1">
@@ -6823,13 +6849,14 @@
           </p:cNvPr>
           <p:cNvCxnSpPr>
             <a:cxnSpLocks/>
+            <a:stCxn id="44" idx="0"/>
           </p:cNvCxnSpPr>
           <p:nvPr/>
         </p:nvCxnSpPr>
         <p:spPr>
           <a:xfrm>
-            <a:off x="8768055" y="1127060"/>
-            <a:ext cx="537011" cy="570521"/>
+            <a:off x="8925107" y="1495190"/>
+            <a:ext cx="379959" cy="202391"/>
           </a:xfrm>
           <a:prstGeom prst="straightConnector1">
             <a:avLst/>
@@ -6908,94 +6935,23 @@
               </a:lnSpc>
             </a:pPr>
             <a:r>
-              <a:rPr lang="en-US" sz="800" b="1" strike="noStrike" spc="-1" dirty="0">
-                <a:solidFill>
-                  <a:srgbClr val="000000"/>
-                </a:solidFill>
-                <a:latin typeface="Acumin Pro" panose="020B0504020202020204" pitchFamily="34" charset="0"/>
-              </a:rPr>
-              <a:t> </a:t>
-            </a:r>
-            <a:r>
               <a:rPr lang="en-US" sz="800" b="0" strike="noStrike" spc="-1" dirty="0">
                 <a:solidFill>
                   <a:srgbClr val="000000"/>
                 </a:solidFill>
                 <a:latin typeface="Acumin Pro" panose="020B0504020202020204" pitchFamily="34" charset="0"/>
               </a:rPr>
-              <a:t>Go to a directory </a:t>
+              <a:t>Go to a directory where you want the project to reside </a:t>
             </a:r>
             <a:r>
               <a:rPr lang="en-US" sz="800" b="0" strike="noStrike" spc="-1" dirty="0">
                 <a:solidFill>
                   <a:srgbClr val="000000"/>
                 </a:solidFill>
-                <a:latin typeface="Wingdings" panose="05000000000000000000" pitchFamily="2" charset="2"/>
-                <a:cs typeface="Calibri" panose="020F0502020204030204" pitchFamily="34" charset="0"/>
-              </a:rPr>
-              <a:t></a:t>
-            </a:r>
-            <a:r>
-              <a:rPr lang="en-US" sz="800" b="0" strike="noStrike" spc="-1" dirty="0">
-                <a:solidFill>
-                  <a:srgbClr val="000000"/>
-                </a:solidFill>
-                <a:latin typeface="Acumin Pro" panose="020B0504020202020204" pitchFamily="34" charset="0"/>
-              </a:rPr>
-              <a:t> right click </a:t>
-            </a:r>
-            <a:r>
-              <a:rPr lang="en-US" sz="800" b="0" strike="noStrike" spc="-1" dirty="0">
-                <a:solidFill>
-                  <a:srgbClr val="000000"/>
-                </a:solidFill>
-                <a:latin typeface="Wingdings" panose="05000000000000000000" pitchFamily="2" charset="2"/>
-                <a:cs typeface="Calibri" panose="020F0502020204030204" pitchFamily="34" charset="0"/>
-              </a:rPr>
-              <a:t></a:t>
-            </a:r>
-            <a:r>
-              <a:rPr lang="en-US" sz="800" b="0" strike="noStrike" spc="-1" dirty="0">
-                <a:solidFill>
-                  <a:srgbClr val="000000"/>
-                </a:solidFill>
-                <a:latin typeface="Acumin Pro" panose="020B0504020202020204" pitchFamily="34" charset="0"/>
-              </a:rPr>
-              <a:t> “Git Bash here”. Finally, type cd {</a:t>
-            </a:r>
-            <a:r>
-              <a:rPr lang="en-US" sz="800" b="0" strike="noStrike" spc="-1" dirty="0" err="1">
-                <a:solidFill>
-                  <a:srgbClr val="000000"/>
-                </a:solidFill>
-                <a:latin typeface="Acumin Pro" panose="020B0504020202020204" pitchFamily="34" charset="0"/>
-              </a:rPr>
-              <a:t>project_name</a:t>
-            </a:r>
-            <a:r>
-              <a:rPr lang="en-US" sz="800" b="0" strike="noStrike" spc="-1" dirty="0">
-                <a:solidFill>
-                  <a:srgbClr val="000000"/>
-                </a:solidFill>
-                <a:latin typeface="Acumin Pro" panose="020B0504020202020204" pitchFamily="34" charset="0"/>
-              </a:rPr>
-              <a:t>}.</a:t>
-            </a:r>
-          </a:p>
-          <a:p>
-            <a:pPr>
-              <a:lnSpc>
-                <a:spcPct val="100000"/>
-              </a:lnSpc>
-            </a:pPr>
-            <a:r>
-              <a:rPr lang="en-US" sz="800" b="0" strike="noStrike" spc="-1" dirty="0">
-                <a:solidFill>
-                  <a:srgbClr val="000000"/>
-                </a:solidFill>
-                <a:latin typeface="Acumin Pro" panose="020B0504020202020204" pitchFamily="34" charset="0"/>
-              </a:rPr>
-              <a:t>Now, clone the repository!</a:t>
+                <a:latin typeface="Acumin Pro" panose="020B0504020202020204" pitchFamily="34" charset="0"/>
+                <a:sym typeface="Wingdings" pitchFamily="2" charset="2"/>
+              </a:rPr>
+              <a:t> open terminal --&gt; run commands below (use the original repository’s username).</a:t>
             </a:r>
             <a:endParaRPr lang="nl-NL" sz="800" b="0" strike="noStrike" spc="-1" dirty="0">
               <a:latin typeface="Acumin Pro" panose="020B0504020202020204" pitchFamily="34" charset="0"/>
@@ -7017,8 +6973,8 @@
         </p:nvSpPr>
         <p:spPr>
           <a:xfrm>
-            <a:off x="6815355" y="354058"/>
-            <a:ext cx="2125272" cy="707886"/>
+            <a:off x="6815355" y="289913"/>
+            <a:ext cx="2125272" cy="830997"/>
           </a:xfrm>
           <a:prstGeom prst="rect">
             <a:avLst/>
@@ -7045,7 +7001,7 @@
                 </a:solidFill>
                 <a:latin typeface="Acumin Pro" panose="020B0504020202020204" pitchFamily="34" charset="0"/>
               </a:rPr>
-              <a:t>3a) Team members check out </a:t>
+              <a:t>3a) Team members clone (= download) </a:t>
             </a:r>
             <a:r>
               <a:rPr lang="en-US" sz="800" b="1" u="sng" spc="-1" dirty="0">
@@ -7088,7 +7044,7 @@
                 </a:solidFill>
                 <a:latin typeface="Acumin Pro" panose="020B0504020202020204" pitchFamily="34" charset="0"/>
               </a:rPr>
-              <a:t>Go to a directory </a:t>
+              <a:t>Go to a directory where you want the project to reside </a:t>
             </a:r>
             <a:r>
               <a:rPr lang="en-US" sz="800" b="0" strike="noStrike" spc="-1" dirty="0">
@@ -7107,60 +7063,46 @@
                 </a:solidFill>
                 <a:latin typeface="Acumin Pro" panose="020B0504020202020204" pitchFamily="34" charset="0"/>
               </a:rPr>
-              <a:t> right click </a:t>
-            </a:r>
-            <a:r>
-              <a:rPr lang="en-US" sz="800" b="0" strike="noStrike" spc="-1" dirty="0">
-                <a:solidFill>
-                  <a:srgbClr val="000000"/>
-                </a:solidFill>
-                <a:latin typeface="Wingdings" panose="05000000000000000000" pitchFamily="2" charset="2"/>
-                <a:cs typeface="Calibri" panose="020F0502020204030204" pitchFamily="34" charset="0"/>
-              </a:rPr>
-              <a:t></a:t>
-            </a:r>
-            <a:r>
-              <a:rPr lang="en-US" sz="800" b="0" strike="noStrike" spc="-1" dirty="0">
-                <a:solidFill>
-                  <a:srgbClr val="000000"/>
-                </a:solidFill>
-                <a:latin typeface="Acumin Pro" panose="020B0504020202020204" pitchFamily="34" charset="0"/>
-              </a:rPr>
-              <a:t> “Git Bash here”. Finally, type cd {</a:t>
-            </a:r>
-            <a:r>
-              <a:rPr lang="en-US" sz="800" b="0" strike="noStrike" spc="-1" dirty="0" err="1">
-                <a:solidFill>
-                  <a:srgbClr val="000000"/>
-                </a:solidFill>
-                <a:latin typeface="Acumin Pro" panose="020B0504020202020204" pitchFamily="34" charset="0"/>
-              </a:rPr>
-              <a:t>project_name</a:t>
-            </a:r>
-            <a:r>
-              <a:rPr lang="en-US" sz="800" b="0" strike="noStrike" spc="-1" dirty="0">
-                <a:solidFill>
-                  <a:srgbClr val="000000"/>
-                </a:solidFill>
-                <a:latin typeface="Acumin Pro" panose="020B0504020202020204" pitchFamily="34" charset="0"/>
-              </a:rPr>
-              <a:t>}.</a:t>
-            </a:r>
-          </a:p>
-          <a:p>
-            <a:pPr>
-              <a:lnSpc>
-                <a:spcPct val="100000"/>
-              </a:lnSpc>
-            </a:pPr>
-            <a:r>
-              <a:rPr lang="en-US" sz="800" b="0" strike="noStrike" spc="-1" dirty="0">
-                <a:solidFill>
-                  <a:srgbClr val="000000"/>
-                </a:solidFill>
-                <a:latin typeface="Acumin Pro" panose="020B0504020202020204" pitchFamily="34" charset="0"/>
-              </a:rPr>
-              <a:t>Now, clone the repository!</a:t>
+              <a:t> open terminal</a:t>
+            </a:r>
+            <a:r>
+              <a:rPr lang="en-US" sz="800" spc="-1" dirty="0">
+                <a:solidFill>
+                  <a:srgbClr val="000000"/>
+                </a:solidFill>
+                <a:latin typeface="Acumin Pro" panose="020B0504020202020204" pitchFamily="34" charset="0"/>
+              </a:rPr>
+              <a:t> </a:t>
+            </a:r>
+            <a:r>
+              <a:rPr lang="en-US" sz="800" spc="-1" dirty="0">
+                <a:solidFill>
+                  <a:srgbClr val="000000"/>
+                </a:solidFill>
+                <a:latin typeface="Acumin Pro" panose="020B0504020202020204" pitchFamily="34" charset="0"/>
+                <a:sym typeface="Wingdings" pitchFamily="2" charset="2"/>
+              </a:rPr>
+              <a:t> run commands below (use </a:t>
+            </a:r>
+            <a:r>
+              <a:rPr lang="en-US" sz="800" i="1" spc="-1" dirty="0">
+                <a:solidFill>
+                  <a:srgbClr val="000000"/>
+                </a:solidFill>
+                <a:latin typeface="Acumin Pro" panose="020B0504020202020204" pitchFamily="34" charset="0"/>
+                <a:sym typeface="Wingdings" pitchFamily="2" charset="2"/>
+              </a:rPr>
+              <a:t>your</a:t>
+            </a:r>
+            <a:r>
+              <a:rPr lang="en-US" sz="800" spc="-1" dirty="0">
+                <a:solidFill>
+                  <a:srgbClr val="000000"/>
+                </a:solidFill>
+                <a:latin typeface="Acumin Pro" panose="020B0504020202020204" pitchFamily="34" charset="0"/>
+                <a:sym typeface="Wingdings" pitchFamily="2" charset="2"/>
+              </a:rPr>
+              <a:t> own username to refer to the fork).</a:t>
             </a:r>
             <a:endParaRPr lang="nl-NL" sz="800" b="0" strike="noStrike" spc="-1" dirty="0">
               <a:latin typeface="Acumin Pro" panose="020B0504020202020204" pitchFamily="34" charset="0"/>
@@ -7168,50 +7110,6 @@
           </a:p>
         </p:txBody>
       </p:sp>
-      <p:cxnSp>
-        <p:nvCxnSpPr>
-          <p:cNvPr id="127" name="Straight Arrow Connector 126">
-            <a:extLst>
-              <a:ext uri="{FF2B5EF4-FFF2-40B4-BE49-F238E27FC236}">
-                <a16:creationId xmlns:a16="http://schemas.microsoft.com/office/drawing/2014/main" id="{70524BF1-33DD-4C0E-BBBB-985C932EFEB1}"/>
-              </a:ext>
-            </a:extLst>
-          </p:cNvPr>
-          <p:cNvCxnSpPr>
-            <a:cxnSpLocks/>
-          </p:cNvCxnSpPr>
-          <p:nvPr/>
-        </p:nvCxnSpPr>
-        <p:spPr>
-          <a:xfrm>
-            <a:off x="10005421" y="2045784"/>
-            <a:ext cx="0" cy="355724"/>
-          </a:xfrm>
-          <a:prstGeom prst="straightConnector1">
-            <a:avLst/>
-          </a:prstGeom>
-          <a:ln w="38100">
-            <a:solidFill>
-              <a:srgbClr val="003366"/>
-            </a:solidFill>
-            <a:tailEnd type="triangle"/>
-          </a:ln>
-        </p:spPr>
-        <p:style>
-          <a:lnRef idx="1">
-            <a:schemeClr val="accent1"/>
-          </a:lnRef>
-          <a:fillRef idx="0">
-            <a:schemeClr val="accent1"/>
-          </a:fillRef>
-          <a:effectRef idx="0">
-            <a:schemeClr val="accent1"/>
-          </a:effectRef>
-          <a:fontRef idx="minor">
-            <a:schemeClr val="tx1"/>
-          </a:fontRef>
-        </p:style>
-      </p:cxnSp>
       <p:cxnSp>
         <p:nvCxnSpPr>
           <p:cNvPr id="129" name="Straight Arrow Connector 128">
@@ -7227,9 +7125,9 @@
           <p:nvPr/>
         </p:nvCxnSpPr>
         <p:spPr>
-          <a:xfrm flipV="1">
-            <a:off x="10005421" y="1469436"/>
-            <a:ext cx="0" cy="367267"/>
+          <a:xfrm>
+            <a:off x="9879270" y="2006261"/>
+            <a:ext cx="294677" cy="0"/>
           </a:xfrm>
           <a:prstGeom prst="straightConnector1">
             <a:avLst/>
@@ -7314,8 +7212,8 @@
         </p:nvSpPr>
         <p:spPr>
           <a:xfrm>
-            <a:off x="2674057" y="4768621"/>
-            <a:ext cx="2656338" cy="584775"/>
+            <a:off x="2674057" y="4679841"/>
+            <a:ext cx="2656338" cy="707886"/>
           </a:xfrm>
           <a:prstGeom prst="rect">
             <a:avLst/>
@@ -7358,7 +7256,25 @@
                 </a:solidFill>
                 <a:latin typeface="Acumin Pro" panose="020B0504020202020204" pitchFamily="34" charset="0"/>
               </a:rPr>
-              <a:t>Create a branch, specific for the issue you will be working on. This helps others to review your code, and avoids conflicts when pulling and pushing changes.</a:t>
+              <a:t>Create a branch with a specific </a:t>
+            </a:r>
+            <a:r>
+              <a:rPr lang="en-US" sz="800" spc="-1" dirty="0">
+                <a:solidFill>
+                  <a:srgbClr val="000000"/>
+                </a:solidFill>
+                <a:latin typeface="Acumin Pro" panose="020B0504020202020204" pitchFamily="34" charset="0"/>
+              </a:rPr>
+              <a:t>name f</a:t>
+            </a:r>
+            <a:r>
+              <a:rPr lang="en-US" sz="800" b="0" strike="noStrike" spc="-1" dirty="0">
+                <a:solidFill>
+                  <a:srgbClr val="000000"/>
+                </a:solidFill>
+                <a:latin typeface="Acumin Pro" panose="020B0504020202020204" pitchFamily="34" charset="0"/>
+              </a:rPr>
+              <a:t>or the issue you will be working on. This helps others to review your code and avoids conflicts when pulling and pushing changes. Do this always – even if you work in a privately shared project.</a:t>
             </a:r>
           </a:p>
         </p:txBody>
@@ -7421,7 +7337,7 @@
         </p:nvSpPr>
         <p:spPr>
           <a:xfrm>
-            <a:off x="4468095" y="3968879"/>
+            <a:off x="4468095" y="3880099"/>
             <a:ext cx="3847905" cy="584775"/>
           </a:xfrm>
           <a:prstGeom prst="rect">
@@ -7486,7 +7402,7 @@
                 </a:solidFill>
                 <a:latin typeface="Acumin Pro" panose="020B0504020202020204" pitchFamily="34" charset="0"/>
               </a:rPr>
-              <a:t>the files in the repository. Working on an issue usually entails multiple commits, which can </a:t>
+              <a:t>the files in the locally cloned repository. Working on an issue usually entails multiple commits, which can </a:t>
             </a:r>
             <a:r>
               <a:rPr lang="en-US" sz="800" b="0" strike="noStrike" spc="-1" dirty="0">
@@ -7513,8 +7429,32 @@
                 </a:solidFill>
                 <a:latin typeface="Acumin Pro" panose="020B0504020202020204" pitchFamily="34" charset="0"/>
               </a:rPr>
-              <a:t>editors such as RStudio.</a:t>
-            </a:r>
+              <a:t>editors such as </a:t>
+            </a:r>
+            <a:r>
+              <a:rPr lang="en-US" sz="800" b="0" strike="noStrike" spc="-1" dirty="0" err="1">
+                <a:solidFill>
+                  <a:srgbClr val="000000"/>
+                </a:solidFill>
+                <a:latin typeface="Acumin Pro" panose="020B0504020202020204" pitchFamily="34" charset="0"/>
+              </a:rPr>
+              <a:t>Rstudio</a:t>
+            </a:r>
+            <a:r>
+              <a:rPr lang="en-US" sz="800" spc="-1" dirty="0">
+                <a:solidFill>
+                  <a:srgbClr val="000000"/>
+                </a:solidFill>
+                <a:latin typeface="Acumin Pro" panose="020B0504020202020204" pitchFamily="34" charset="0"/>
+              </a:rPr>
+              <a:t> or Visual Studio Code.</a:t>
+            </a:r>
+            <a:endParaRPr lang="en-US" sz="800" b="0" strike="noStrike" spc="-1" dirty="0">
+              <a:solidFill>
+                <a:srgbClr val="000000"/>
+              </a:solidFill>
+              <a:latin typeface="Acumin Pro" panose="020B0504020202020204" pitchFamily="34" charset="0"/>
+            </a:endParaRPr>
           </a:p>
         </p:txBody>
       </p:sp>
@@ -7628,7 +7568,7 @@
                 </a:solidFill>
                 <a:latin typeface="Acumin Pro" panose="020B0504020202020204" pitchFamily="34" charset="0"/>
               </a:rPr>
-              <a:t> (i.e., select one from the Issues or Project page)</a:t>
+              <a:t> (i.e., select one from the issues or project page)</a:t>
             </a:r>
           </a:p>
           <a:p>
@@ -7675,7 +7615,25 @@
                 </a:solidFill>
                 <a:latin typeface="Acumin Pro" panose="020B0504020202020204" pitchFamily="34" charset="0"/>
               </a:rPr>
-              <a:t> – check if fork is up-to-date using </a:t>
+              <a:t> </a:t>
+            </a:r>
+            <a:r>
+              <a:rPr lang="en-US" sz="800" spc="-1" dirty="0">
+                <a:solidFill>
+                  <a:srgbClr val="000000"/>
+                </a:solidFill>
+                <a:latin typeface="Acumin Pro" panose="020B0504020202020204" pitchFamily="34" charset="0"/>
+              </a:rPr>
+              <a:t>(2a above) - check </a:t>
+            </a:r>
+            <a:r>
+              <a:rPr lang="en-US" sz="800" b="0" strike="noStrike" spc="-1" dirty="0">
+                <a:solidFill>
+                  <a:srgbClr val="000000"/>
+                </a:solidFill>
+                <a:latin typeface="Acumin Pro" panose="020B0504020202020204" pitchFamily="34" charset="0"/>
+              </a:rPr>
+              <a:t>if fork is up-to-date using </a:t>
             </a:r>
             <a:r>
               <a:rPr lang="en-US" sz="800" u="sng" spc="-1" dirty="0">
@@ -7711,7 +7669,7 @@
                 </a:solidFill>
                 <a:latin typeface="Acumin Pro" panose="020B0504020202020204" pitchFamily="34" charset="0"/>
               </a:rPr>
-              <a:t>Github.com</a:t>
+              <a:t>GitHub.com</a:t>
             </a:r>
             <a:r>
               <a:rPr lang="en-US" sz="800" spc="-1" dirty="0">
@@ -7793,7 +7751,7 @@
         </p:nvGrpSpPr>
         <p:grpSpPr>
           <a:xfrm>
-            <a:off x="7335963" y="1057711"/>
+            <a:off x="7335963" y="1198391"/>
             <a:ext cx="1589144" cy="644060"/>
             <a:chOff x="8026444" y="1082658"/>
             <a:chExt cx="1589144" cy="644060"/>
@@ -7902,7 +7860,7 @@
                 </a:lnSpc>
               </a:pPr>
               <a:r>
-                <a:rPr lang="en-US" sz="700" b="0" strike="noStrike" spc="-1" dirty="0">
+                <a:rPr lang="en-US" sz="700" b="1" strike="noStrike" spc="-1" dirty="0">
                   <a:solidFill>
                     <a:srgbClr val="000000"/>
                   </a:solidFill>
@@ -7911,7 +7869,7 @@
                 </a:rPr>
                 <a:t>git clone [your url]</a:t>
               </a:r>
-              <a:endParaRPr lang="nl-NL" sz="700" b="0" strike="noStrike" spc="-1" dirty="0">
+              <a:endParaRPr lang="nl-NL" sz="700" b="1" strike="noStrike" spc="-1" dirty="0">
                 <a:latin typeface="Roboto Mono Light" panose="00000009000000000000" pitchFamily="49" charset="0"/>
                 <a:ea typeface="Roboto Mono Light" panose="00000009000000000000" pitchFamily="49" charset="0"/>
               </a:endParaRPr>
@@ -8182,7 +8140,7 @@
         </p:nvCxnSpPr>
         <p:spPr>
           <a:xfrm>
-            <a:off x="10416507" y="5042352"/>
+            <a:off x="10356677" y="4606854"/>
             <a:ext cx="0" cy="293114"/>
           </a:xfrm>
           <a:prstGeom prst="straightConnector1">
@@ -8225,7 +8183,7 @@
         <p:spPr>
           <a:xfrm>
             <a:off x="9031465" y="3984518"/>
-            <a:ext cx="2792340" cy="1075764"/>
+            <a:ext cx="2792340" cy="583321"/>
           </a:xfrm>
           <a:prstGeom prst="rect">
             <a:avLst/>
@@ -8312,40 +8270,8 @@
                 </a:solidFill>
                 <a:latin typeface="Acumin Pro" panose="020B0504020202020204" pitchFamily="34" charset="0"/>
               </a:rPr>
-              <a:t>/write/issues!</a:t>
-            </a:r>
-          </a:p>
-          <a:p>
-            <a:pPr>
-              <a:lnSpc>
-                <a:spcPct val="100000"/>
-              </a:lnSpc>
-            </a:pPr>
-            <a:endParaRPr lang="en-US" sz="800" spc="-1" dirty="0">
-              <a:solidFill>
-                <a:srgbClr val="000000"/>
-              </a:solidFill>
-              <a:latin typeface="Acumin Pro" panose="020B0504020202020204" pitchFamily="34" charset="0"/>
-            </a:endParaRPr>
-          </a:p>
-          <a:p>
-            <a:pPr>
-              <a:lnSpc>
-                <a:spcPct val="100000"/>
-              </a:lnSpc>
-            </a:pPr>
-            <a:r>
-              <a:rPr lang="en-US" sz="800" spc="-1" dirty="0">
-                <a:solidFill>
-                  <a:srgbClr val="000000"/>
-                </a:solidFill>
-                <a:latin typeface="Acumin Pro" panose="020B0504020202020204" pitchFamily="34" charset="0"/>
-              </a:rPr>
-              <a:t>If you worked on a forked repository, follow step 5A above to contribute your changes to the main repository.</a:t>
-            </a:r>
-            <a:endParaRPr lang="nl-NL" sz="800" b="0" strike="noStrike" spc="-1" dirty="0">
-              <a:latin typeface="Acumin Pro" panose="020B0504020202020204" pitchFamily="34" charset="0"/>
-            </a:endParaRPr>
+              <a:t>/write/issues.</a:t>
+            </a:r>
           </a:p>
         </p:txBody>
       </p:sp>
@@ -8363,8 +8289,8 @@
         </p:nvSpPr>
         <p:spPr>
           <a:xfrm>
-            <a:off x="9009210" y="5336160"/>
-            <a:ext cx="2814594" cy="952653"/>
+            <a:off x="9009211" y="4915120"/>
+            <a:ext cx="2814594" cy="1198875"/>
           </a:xfrm>
           <a:prstGeom prst="rect">
             <a:avLst/>
@@ -8437,9 +8363,70 @@
                 </a:solidFill>
                 <a:latin typeface="Acumin Pro" panose="020B0504020202020204" pitchFamily="34" charset="0"/>
               </a:rPr>
-              <a:t>Happy with your changes and ready to ask team members to integrate them with your main project? Make a pull request! </a:t>
-            </a:r>
-            <a:endParaRPr lang="en-US" sz="800" strike="noStrike" spc="-1" dirty="0">
+              <a:t>Happy with the changes, and ready to ask team members to integrate these changes with the main branch of your (original) repository? Make a pull request. </a:t>
+            </a:r>
+            <a:r>
+              <a:rPr lang="en-US" sz="800" b="0" strike="noStrike" spc="-1" dirty="0">
+                <a:solidFill>
+                  <a:srgbClr val="000000"/>
+                </a:solidFill>
+                <a:latin typeface="Acumin Pro" panose="020B0504020202020204" pitchFamily="34" charset="0"/>
+              </a:rPr>
+              <a:t>See </a:t>
+            </a:r>
+            <a:r>
+              <a:rPr lang="en-US" sz="800" spc="-1" dirty="0" err="1">
+                <a:solidFill>
+                  <a:srgbClr val="000000"/>
+                </a:solidFill>
+                <a:latin typeface="Acumin Pro" panose="020B0504020202020204" pitchFamily="34" charset="0"/>
+              </a:rPr>
+              <a:t>tilburgsciencehub.com</a:t>
+            </a:r>
+            <a:r>
+              <a:rPr lang="en-US" sz="800" spc="-1" dirty="0">
+                <a:solidFill>
+                  <a:srgbClr val="000000"/>
+                </a:solidFill>
+                <a:latin typeface="Acumin Pro" panose="020B0504020202020204" pitchFamily="34" charset="0"/>
+              </a:rPr>
+              <a:t>/contribute/</a:t>
+            </a:r>
+            <a:r>
+              <a:rPr lang="en-US" sz="800" spc="-1" dirty="0" err="1">
+                <a:solidFill>
+                  <a:srgbClr val="000000"/>
+                </a:solidFill>
+                <a:latin typeface="Acumin Pro" panose="020B0504020202020204" pitchFamily="34" charset="0"/>
+              </a:rPr>
+              <a:t>pullrequests</a:t>
+            </a:r>
+            <a:r>
+              <a:rPr lang="en-US" sz="800" spc="-1" dirty="0">
+                <a:solidFill>
+                  <a:srgbClr val="000000"/>
+                </a:solidFill>
+                <a:latin typeface="Acumin Pro" panose="020B0504020202020204" pitchFamily="34" charset="0"/>
+              </a:rPr>
+              <a:t> </a:t>
+            </a:r>
+            <a:r>
+              <a:rPr lang="en-US" sz="800" b="0" strike="noStrike" spc="-1" dirty="0">
+                <a:solidFill>
+                  <a:srgbClr val="000000"/>
+                </a:solidFill>
+                <a:latin typeface="Acumin Pro" panose="020B0504020202020204" pitchFamily="34" charset="0"/>
+              </a:rPr>
+              <a:t>to find out how.</a:t>
+            </a:r>
+          </a:p>
+          <a:p>
+            <a:pPr>
+              <a:lnSpc>
+                <a:spcPct val="100000"/>
+              </a:lnSpc>
+            </a:pPr>
+            <a:endParaRPr lang="en-US" sz="800" spc="-1" dirty="0">
               <a:solidFill>
                 <a:srgbClr val="000000"/>
               </a:solidFill>
@@ -8452,76 +8439,78 @@
                 <a:spcPct val="100000"/>
               </a:lnSpc>
             </a:pPr>
-            <a:endParaRPr lang="en-US" sz="800" strike="noStrike" spc="-1" dirty="0">
-              <a:solidFill>
-                <a:srgbClr val="000000"/>
-              </a:solidFill>
-              <a:latin typeface="Acumin Pro" panose="020B0504020202020204" pitchFamily="34" charset="0"/>
-            </a:endParaRPr>
-          </a:p>
-          <a:p>
-            <a:pPr>
-              <a:lnSpc>
-                <a:spcPct val="100000"/>
-              </a:lnSpc>
-            </a:pPr>
-            <a:r>
-              <a:rPr lang="en-US" sz="800" b="0" strike="noStrike" spc="-1" dirty="0">
-                <a:solidFill>
-                  <a:srgbClr val="000000"/>
-                </a:solidFill>
-                <a:latin typeface="Acumin Pro" panose="020B0504020202020204" pitchFamily="34" charset="0"/>
-              </a:rPr>
-              <a:t>See </a:t>
-            </a:r>
-            <a:r>
-              <a:rPr lang="en-US" sz="800" spc="-1" dirty="0" err="1">
-                <a:solidFill>
-                  <a:srgbClr val="000000"/>
-                </a:solidFill>
-                <a:latin typeface="Acumin Pro" panose="020B0504020202020204" pitchFamily="34" charset="0"/>
-              </a:rPr>
-              <a:t>tilburgsciencehub.com</a:t>
-            </a:r>
-            <a:r>
-              <a:rPr lang="en-US" sz="800" spc="-1" dirty="0">
-                <a:solidFill>
-                  <a:srgbClr val="000000"/>
-                </a:solidFill>
-                <a:latin typeface="Acumin Pro" panose="020B0504020202020204" pitchFamily="34" charset="0"/>
-              </a:rPr>
-              <a:t>/contribute/</a:t>
-            </a:r>
-            <a:r>
-              <a:rPr lang="en-US" sz="800" spc="-1" dirty="0" err="1">
-                <a:solidFill>
-                  <a:srgbClr val="000000"/>
-                </a:solidFill>
-                <a:latin typeface="Acumin Pro" panose="020B0504020202020204" pitchFamily="34" charset="0"/>
-              </a:rPr>
-              <a:t>pullrequests</a:t>
-            </a:r>
-            <a:r>
-              <a:rPr lang="en-US" sz="800" spc="-1" dirty="0">
-                <a:solidFill>
-                  <a:srgbClr val="000000"/>
-                </a:solidFill>
+            <a:r>
+              <a:rPr lang="nl-NL" sz="800" b="0" strike="noStrike" spc="-1" dirty="0" err="1">
+                <a:latin typeface="Acumin Pro" panose="020B0504020202020204" pitchFamily="34" charset="0"/>
+              </a:rPr>
+              <a:t>Your</a:t>
+            </a:r>
+            <a:r>
+              <a:rPr lang="nl-NL" sz="800" b="0" strike="noStrike" spc="-1" dirty="0">
+                <a:latin typeface="Acumin Pro" panose="020B0504020202020204" pitchFamily="34" charset="0"/>
+              </a:rPr>
+              <a:t> team members </a:t>
+            </a:r>
+            <a:r>
+              <a:rPr lang="nl-NL" sz="800" b="0" strike="noStrike" spc="-1" dirty="0" err="1">
+                <a:latin typeface="Acumin Pro" panose="020B0504020202020204" pitchFamily="34" charset="0"/>
+              </a:rPr>
+              <a:t>now</a:t>
+            </a:r>
+            <a:r>
+              <a:rPr lang="nl-NL" sz="800" b="0" strike="noStrike" spc="-1" dirty="0">
                 <a:latin typeface="Acumin Pro" panose="020B0504020202020204" pitchFamily="34" charset="0"/>
               </a:rPr>
               <a:t> </a:t>
             </a:r>
             <a:r>
-              <a:rPr lang="en-US" sz="800" b="0" strike="noStrike" spc="-1" dirty="0">
-                <a:solidFill>
-                  <a:srgbClr val="000000"/>
-                </a:solidFill>
-                <a:latin typeface="Acumin Pro" panose="020B0504020202020204" pitchFamily="34" charset="0"/>
-              </a:rPr>
-              <a:t>to find out how to perform pull requests!</a:t>
-            </a:r>
-            <a:endParaRPr lang="nl-NL" sz="800" b="0" strike="noStrike" spc="-1" dirty="0">
-              <a:latin typeface="Acumin Pro" panose="020B0504020202020204" pitchFamily="34" charset="0"/>
-            </a:endParaRPr>
+              <a:rPr lang="nl-NL" sz="800" b="0" strike="noStrike" spc="-1" dirty="0" err="1">
+                <a:latin typeface="Acumin Pro" panose="020B0504020202020204" pitchFamily="34" charset="0"/>
+              </a:rPr>
+              <a:t>can</a:t>
+            </a:r>
+            <a:r>
+              <a:rPr lang="nl-NL" sz="800" b="0" strike="noStrike" spc="-1" dirty="0">
+                <a:latin typeface="Acumin Pro" panose="020B0504020202020204" pitchFamily="34" charset="0"/>
+              </a:rPr>
+              <a:t> review </a:t>
+            </a:r>
+            <a:r>
+              <a:rPr lang="nl-NL" sz="800" b="0" strike="noStrike" spc="-1" dirty="0" err="1">
+                <a:latin typeface="Acumin Pro" panose="020B0504020202020204" pitchFamily="34" charset="0"/>
+              </a:rPr>
+              <a:t>and</a:t>
+            </a:r>
+            <a:r>
+              <a:rPr lang="nl-NL" sz="800" b="0" strike="noStrike" spc="-1" dirty="0">
+                <a:latin typeface="Acumin Pro" panose="020B0504020202020204" pitchFamily="34" charset="0"/>
+              </a:rPr>
+              <a:t> </a:t>
+            </a:r>
+            <a:r>
+              <a:rPr lang="nl-NL" sz="800" b="0" strike="noStrike" spc="-1" dirty="0" err="1">
+                <a:latin typeface="Acumin Pro" panose="020B0504020202020204" pitchFamily="34" charset="0"/>
+              </a:rPr>
+              <a:t>integrate</a:t>
+            </a:r>
+            <a:r>
+              <a:rPr lang="nl-NL" sz="800" b="0" strike="noStrike" spc="-1" dirty="0">
+                <a:latin typeface="Acumin Pro" panose="020B0504020202020204" pitchFamily="34" charset="0"/>
+              </a:rPr>
+              <a:t> </a:t>
+            </a:r>
+            <a:r>
+              <a:rPr lang="nl-NL" sz="800" b="0" strike="noStrike" spc="-1" dirty="0" err="1">
+                <a:latin typeface="Acumin Pro" panose="020B0504020202020204" pitchFamily="34" charset="0"/>
+              </a:rPr>
+              <a:t>your</a:t>
+            </a:r>
+            <a:r>
+              <a:rPr lang="nl-NL" sz="800" b="0" strike="noStrike" spc="-1" dirty="0">
+                <a:latin typeface="Acumin Pro" panose="020B0504020202020204" pitchFamily="34" charset="0"/>
+              </a:rPr>
+              <a:t> changes.</a:t>
+            </a:r>
           </a:p>
         </p:txBody>
       </p:sp>
@@ -8533,8 +8522,8 @@
         </p:nvSpPr>
         <p:spPr>
           <a:xfrm>
-            <a:off x="8946343" y="1752971"/>
-            <a:ext cx="1497893" cy="337100"/>
+            <a:off x="8946344" y="1752971"/>
+            <a:ext cx="924834" cy="460211"/>
           </a:xfrm>
           <a:prstGeom prst="rect">
             <a:avLst/>
@@ -8585,16 +8574,28 @@
                 </a:solidFill>
                 <a:latin typeface="Acumin Pro" panose="020B0504020202020204" pitchFamily="34" charset="0"/>
               </a:rPr>
-              <a:t>Follow the Git Workflow</a:t>
-            </a:r>
-            <a:br>
-              <a:rPr lang="en-US" sz="800" spc="-1" dirty="0">
-                <a:solidFill>
-                  <a:srgbClr val="000000"/>
-                </a:solidFill>
-                <a:latin typeface="Acumin Pro" panose="020B0504020202020204" pitchFamily="34" charset="0"/>
-              </a:rPr>
-            </a:br>
+              <a:t>Follow</a:t>
+            </a:r>
+          </a:p>
+          <a:p>
+            <a:pPr>
+              <a:lnSpc>
+                <a:spcPct val="100000"/>
+              </a:lnSpc>
+            </a:pPr>
+            <a:endParaRPr lang="en-US" sz="800" spc="-1" dirty="0">
+              <a:solidFill>
+                <a:srgbClr val="000000"/>
+              </a:solidFill>
+              <a:latin typeface="Acumin Pro" panose="020B0504020202020204" pitchFamily="34" charset="0"/>
+            </a:endParaRPr>
+          </a:p>
+          <a:p>
+            <a:pPr>
+              <a:lnSpc>
+                <a:spcPct val="100000"/>
+              </a:lnSpc>
+            </a:pPr>
             <a:r>
               <a:rPr lang="en-US" sz="800" spc="-1" dirty="0">
                 <a:solidFill>
@@ -8624,8 +8625,8 @@
         </p:nvSpPr>
         <p:spPr>
           <a:xfrm>
-            <a:off x="9476921" y="1794513"/>
-            <a:ext cx="886272" cy="123111"/>
+            <a:off x="9034166" y="1927498"/>
+            <a:ext cx="780555" cy="123111"/>
           </a:xfrm>
           <a:prstGeom prst="rect">
             <a:avLst/>

</xml_diff>

<commit_message>
Revert "update cheatsheet for github"
This reverts commit dc36df1d865fc1a493e65f3a82bd216b7aa2ce84.
</commit_message>
<xml_diff>
--- a/content/building-blocks/collaborate-and-share-your-work/use-github/github_cheatsheet_tsh.pptx
+++ b/content/building-blocks/collaborate-and-share-your-work/use-github/github_cheatsheet_tsh.pptx
@@ -205,7 +205,7 @@
           <a:p>
             <a:fld id="{B2673ADC-D0E9-8447-A5F0-07DF81F0DDC8}" type="datetimeFigureOut">
               <a:rPr lang="en-NL" smtClean="0"/>
-              <a:t>05/09/2023</a:t>
+              <a:t>08/09/2022</a:t>
             </a:fld>
             <a:endParaRPr lang="en-NL"/>
           </a:p>
@@ -3570,7 +3570,7 @@
         </p:blipFill>
         <p:spPr>
           <a:xfrm>
-            <a:off x="-3832409" y="-96406"/>
+            <a:off x="-4249968" y="-281206"/>
             <a:ext cx="17009059" cy="9347200"/>
           </a:xfrm>
           <a:prstGeom prst="rect">
@@ -3592,8 +3592,8 @@
         </p:nvSpPr>
         <p:spPr>
           <a:xfrm rot="10800000" flipH="1">
-            <a:off x="2674780" y="5362270"/>
-            <a:ext cx="2656338" cy="1209518"/>
+            <a:off x="2674780" y="5362271"/>
+            <a:ext cx="2656338" cy="1028629"/>
           </a:xfrm>
           <a:prstGeom prst="snip1Rect">
             <a:avLst/>
@@ -3646,7 +3646,7 @@
         </p:nvSpPr>
         <p:spPr>
           <a:xfrm>
-            <a:off x="1087862" y="1273576"/>
+            <a:off x="1164402" y="1273576"/>
             <a:ext cx="476790" cy="601520"/>
           </a:xfrm>
           <a:prstGeom prst="can">
@@ -3911,7 +3911,7 @@
                 </a:solidFill>
                 <a:latin typeface="Acumin Pro" panose="020B0504020202020204" pitchFamily="34" charset="0"/>
               </a:rPr>
-              <a:t>Ideally, use a repository template to start.</a:t>
+              <a:t>Ideally, use a the template to start.</a:t>
             </a:r>
             <a:endParaRPr lang="nl-NL" sz="800" b="0" strike="noStrike" spc="-1" dirty="0">
               <a:latin typeface="Acumin Pro" panose="020B0504020202020204" pitchFamily="34" charset="0"/>
@@ -3928,7 +3928,7 @@
         <p:spPr>
           <a:xfrm>
             <a:off x="686131" y="1911894"/>
-            <a:ext cx="1280252" cy="213990"/>
+            <a:ext cx="1511640" cy="213990"/>
           </a:xfrm>
           <a:prstGeom prst="rect">
             <a:avLst/>
@@ -3956,7 +3956,7 @@
           </a:bodyPr>
           <a:lstStyle/>
           <a:p>
-            <a:pPr algn="ctr">
+            <a:pPr>
               <a:lnSpc>
                 <a:spcPct val="100000"/>
               </a:lnSpc>
@@ -4362,8 +4362,8 @@
         </p:nvSpPr>
         <p:spPr>
           <a:xfrm>
-            <a:off x="4015577" y="286211"/>
-            <a:ext cx="2207119" cy="583321"/>
+            <a:off x="4015577" y="349517"/>
+            <a:ext cx="2207119" cy="460211"/>
           </a:xfrm>
           <a:prstGeom prst="rect">
             <a:avLst/>
@@ -4442,25 +4442,7 @@
                 </a:solidFill>
                 <a:latin typeface="Acumin Pro" panose="020B0504020202020204" pitchFamily="34" charset="0"/>
               </a:rPr>
-              <a:t>Team members fork (=copy) the repository to their </a:t>
-            </a:r>
-            <a:r>
-              <a:rPr lang="en-US" sz="800" b="0" i="1" strike="noStrike" spc="-1" dirty="0">
-                <a:solidFill>
-                  <a:srgbClr val="000000"/>
-                </a:solidFill>
-                <a:latin typeface="Acumin Pro" panose="020B0504020202020204" pitchFamily="34" charset="0"/>
-              </a:rPr>
-              <a:t>own</a:t>
-            </a:r>
-            <a:r>
-              <a:rPr lang="en-US" sz="800" b="0" strike="noStrike" spc="-1" dirty="0">
-                <a:solidFill>
-                  <a:srgbClr val="000000"/>
-                </a:solidFill>
-                <a:latin typeface="Acumin Pro" panose="020B0504020202020204" pitchFamily="34" charset="0"/>
-              </a:rPr>
-              <a:t> GitHub account. The fork can be synchronized with its origin.</a:t>
+              <a:t>Team members fork (=copy) the repository to their own GitHub account.</a:t>
             </a:r>
             <a:endParaRPr lang="nl-NL" sz="800" b="0" strike="noStrike" spc="-1" dirty="0">
               <a:latin typeface="Acumin Pro" panose="020B0504020202020204" pitchFamily="34" charset="0"/>
@@ -4482,7 +4464,7 @@
         </p:nvGrpSpPr>
         <p:grpSpPr>
           <a:xfrm>
-            <a:off x="7327258" y="3004785"/>
+            <a:off x="7327258" y="2927411"/>
             <a:ext cx="1574768" cy="593598"/>
             <a:chOff x="7193655" y="3286561"/>
             <a:chExt cx="1574768" cy="593598"/>
@@ -4591,27 +4573,27 @@
                 </a:lnSpc>
               </a:pPr>
               <a:r>
-                <a:rPr lang="en-US" sz="700" b="1" dirty="0">
+                <a:rPr lang="en-US" sz="700" dirty="0">
                   <a:latin typeface="Roboto Mono Light" panose="00000009000000000000" pitchFamily="49" charset="0"/>
                   <a:ea typeface="Roboto Mono Light" panose="00000009000000000000" pitchFamily="49" charset="0"/>
                 </a:rPr>
                 <a:t>git clone [owner </a:t>
               </a:r>
               <a:r>
-                <a:rPr lang="en-US" sz="700" b="1" dirty="0" err="1">
+                <a:rPr lang="en-US" sz="700" dirty="0" err="1">
                   <a:latin typeface="Roboto Mono Light" panose="00000009000000000000" pitchFamily="49" charset="0"/>
                   <a:ea typeface="Roboto Mono Light" panose="00000009000000000000" pitchFamily="49" charset="0"/>
                 </a:rPr>
                 <a:t>url</a:t>
               </a:r>
               <a:r>
-                <a:rPr lang="en-US" sz="700" b="1" dirty="0">
+                <a:rPr lang="en-US" sz="700" dirty="0">
                   <a:latin typeface="Roboto Mono Light" panose="00000009000000000000" pitchFamily="49" charset="0"/>
                   <a:ea typeface="Roboto Mono Light" panose="00000009000000000000" pitchFamily="49" charset="0"/>
                 </a:rPr>
                 <a:t>]</a:t>
               </a:r>
-              <a:endParaRPr lang="nl-NL" sz="700" b="1" dirty="0">
+              <a:endParaRPr lang="nl-NL" sz="700" dirty="0">
                 <a:latin typeface="Roboto Mono Light" panose="00000009000000000000" pitchFamily="49" charset="0"/>
                 <a:ea typeface="Roboto Mono Light" panose="00000009000000000000" pitchFamily="49" charset="0"/>
               </a:endParaRPr>
@@ -4695,8 +4677,8 @@
         </p:nvSpPr>
         <p:spPr>
           <a:xfrm>
-            <a:off x="10165856" y="1405377"/>
-            <a:ext cx="1833304" cy="1321985"/>
+            <a:off x="9533286" y="626674"/>
+            <a:ext cx="2125273" cy="829543"/>
           </a:xfrm>
           <a:prstGeom prst="rect">
             <a:avLst/>
@@ -4738,7 +4720,7 @@
                 </a:solidFill>
                 <a:latin typeface="Acumin Pro" panose="020B0504020202020204" pitchFamily="34" charset="0"/>
               </a:rPr>
-              <a:t>5) Review Pull Request and </a:t>
+              <a:t>5a) Review Pull Request and </a:t>
             </a:r>
             <a:r>
               <a:rPr lang="en-US" sz="800" b="1" spc="-1" dirty="0">
@@ -4763,45 +4745,73 @@
               </a:lnSpc>
             </a:pPr>
             <a:r>
-              <a:rPr lang="en-US" sz="800" spc="-1" dirty="0">
-                <a:solidFill>
-                  <a:srgbClr val="000000"/>
-                </a:solidFill>
-                <a:latin typeface="Acumin Pro" panose="020B0504020202020204" pitchFamily="34" charset="0"/>
-              </a:rPr>
-              <a:t>Team members make </a:t>
-            </a:r>
-            <a:r>
-              <a:rPr lang="en-US" sz="800" b="1" spc="-1" dirty="0">
-                <a:solidFill>
-                  <a:srgbClr val="000000"/>
-                </a:solidFill>
-                <a:latin typeface="Acumin Pro" panose="020B0504020202020204" pitchFamily="34" charset="0"/>
-              </a:rPr>
-              <a:t>pull requests </a:t>
-            </a:r>
-            <a:r>
-              <a:rPr lang="en-US" sz="800" spc="-1" dirty="0">
-                <a:solidFill>
-                  <a:srgbClr val="000000"/>
-                </a:solidFill>
-                <a:latin typeface="Acumin Pro" panose="020B0504020202020204" pitchFamily="34" charset="0"/>
-              </a:rPr>
-              <a:t>to ask for code changes to be integrated in the main project. </a:t>
-            </a:r>
-          </a:p>
+              <a:rPr lang="en-US" sz="800" strike="noStrike" spc="-1" dirty="0">
+                <a:solidFill>
+                  <a:srgbClr val="000000"/>
+                </a:solidFill>
+                <a:latin typeface="Acumin Pro" panose="020B0504020202020204" pitchFamily="34" charset="0"/>
+              </a:rPr>
+              <a:t>Changes at this point are only visible in the local repository. Go to the Pull Requests tab, and review submitted requests. Finally, merge them into your main project, and close the corresponding issue. </a:t>
+            </a:r>
+            <a:endParaRPr lang="nl-NL" sz="800" b="0" strike="noStrike" spc="-1" dirty="0">
+              <a:latin typeface="Acumin Pro" panose="020B0504020202020204" pitchFamily="34" charset="0"/>
+            </a:endParaRPr>
+          </a:p>
+        </p:txBody>
+      </p:sp>
+      <p:sp>
+        <p:nvSpPr>
+          <p:cNvPr id="170" name="CustomShape 34"/>
+          <p:cNvSpPr/>
+          <p:nvPr/>
+        </p:nvSpPr>
+        <p:spPr>
+          <a:xfrm>
+            <a:off x="9772912" y="2417224"/>
+            <a:ext cx="1723015" cy="706432"/>
+          </a:xfrm>
+          <a:prstGeom prst="rect">
+            <a:avLst/>
+          </a:prstGeom>
+          <a:solidFill>
+            <a:schemeClr val="bg1"/>
+          </a:solidFill>
+          <a:ln>
+            <a:noFill/>
+          </a:ln>
+        </p:spPr>
+        <p:style>
+          <a:lnRef idx="0">
+            <a:scrgbClr r="0" g="0" b="0"/>
+          </a:lnRef>
+          <a:fillRef idx="0">
+            <a:scrgbClr r="0" g="0" b="0"/>
+          </a:fillRef>
+          <a:effectRef idx="0">
+            <a:scrgbClr r="0" g="0" b="0"/>
+          </a:effectRef>
+          <a:fontRef idx="minor"/>
+        </p:style>
+        <p:txBody>
+          <a:bodyPr wrap="square" lIns="90000" tIns="45000" rIns="90000" bIns="45000">
+            <a:spAutoFit/>
+          </a:bodyPr>
+          <a:lstStyle/>
           <a:p>
             <a:pPr>
               <a:lnSpc>
                 <a:spcPct val="100000"/>
               </a:lnSpc>
             </a:pPr>
-            <a:endParaRPr lang="en-US" sz="800" spc="-1" dirty="0">
-              <a:solidFill>
-                <a:srgbClr val="000000"/>
-              </a:solidFill>
-              <a:latin typeface="Acumin Pro" panose="020B0504020202020204" pitchFamily="34" charset="0"/>
-            </a:endParaRPr>
+            <a:r>
+              <a:rPr lang="en-US" sz="800" b="1" strike="noStrike" spc="-1" dirty="0">
+                <a:solidFill>
+                  <a:srgbClr val="000000"/>
+                </a:solidFill>
+                <a:latin typeface="Acumin Pro" panose="020B0504020202020204" pitchFamily="34" charset="0"/>
+              </a:rPr>
+              <a:t>5b) Close Issue</a:t>
+            </a:r>
           </a:p>
           <a:p>
             <a:pPr>
@@ -4810,22 +4820,22 @@
               </a:lnSpc>
             </a:pPr>
             <a:r>
-              <a:rPr lang="en-US" sz="800" spc="-1" dirty="0">
-                <a:solidFill>
-                  <a:srgbClr val="000000"/>
-                </a:solidFill>
-                <a:latin typeface="Acumin Pro" panose="020B0504020202020204" pitchFamily="34" charset="0"/>
-              </a:rPr>
-              <a:t>To review and accept these requests, go </a:t>
-            </a:r>
-            <a:r>
               <a:rPr lang="en-US" sz="800" strike="noStrike" spc="-1" dirty="0">
                 <a:solidFill>
                   <a:srgbClr val="000000"/>
                 </a:solidFill>
                 <a:latin typeface="Acumin Pro" panose="020B0504020202020204" pitchFamily="34" charset="0"/>
               </a:rPr>
-              <a:t>to the Pull Requests tab, and review submitted requests. Finally, merge them into your original project, and close the corresponding issue. </a:t>
+              <a:t>Since you work in the owner’s </a:t>
+            </a:r>
+            <a:r>
+              <a:rPr lang="en-US" sz="800" b="0" strike="noStrike" spc="-1" dirty="0">
+                <a:solidFill>
+                  <a:srgbClr val="000000"/>
+                </a:solidFill>
+                <a:latin typeface="Acumin Pro" panose="020B0504020202020204" pitchFamily="34" charset="0"/>
+              </a:rPr>
+              <a:t>repository, all changes are already visible online. Close the corresponding issue.</a:t>
             </a:r>
             <a:endParaRPr lang="nl-NL" sz="800" b="0" strike="noStrike" spc="-1" dirty="0">
               <a:latin typeface="Acumin Pro" panose="020B0504020202020204" pitchFamily="34" charset="0"/>
@@ -4893,10 +4903,10 @@
         </p:nvGrpSpPr>
         <p:grpSpPr>
           <a:xfrm>
-            <a:off x="4137236" y="1046940"/>
-            <a:ext cx="7264936" cy="1464523"/>
-            <a:chOff x="3886865" y="984347"/>
-            <a:chExt cx="7264936" cy="1464523"/>
+            <a:off x="3913382" y="1046940"/>
+            <a:ext cx="7488790" cy="1464523"/>
+            <a:chOff x="3663011" y="984347"/>
+            <a:chExt cx="7488790" cy="1464523"/>
           </a:xfrm>
         </p:grpSpPr>
         <p:sp>
@@ -4985,8 +4995,8 @@
           </p:nvSpPr>
           <p:spPr>
             <a:xfrm>
-              <a:off x="3886865" y="1935594"/>
-              <a:ext cx="1304423" cy="213990"/>
+              <a:off x="3663011" y="1877827"/>
+              <a:ext cx="6095520" cy="213990"/>
             </a:xfrm>
             <a:prstGeom prst="rect">
               <a:avLst/>
@@ -5009,7 +5019,7 @@
             <a:fontRef idx="minor"/>
           </p:style>
           <p:txBody>
-            <a:bodyPr wrap="square" lIns="90000" tIns="45000" rIns="90000" bIns="45000">
+            <a:bodyPr lIns="90000" tIns="45000" rIns="90000" bIns="45000">
               <a:spAutoFit/>
             </a:bodyPr>
             <a:lstStyle/>
@@ -5990,8 +6000,8 @@
         </p:nvSpPr>
         <p:spPr>
           <a:xfrm>
-            <a:off x="2674058" y="5404864"/>
-            <a:ext cx="2632594" cy="1200329"/>
+            <a:off x="2674058" y="5355626"/>
+            <a:ext cx="2632594" cy="1077218"/>
           </a:xfrm>
           <a:prstGeom prst="rect">
             <a:avLst/>
@@ -6019,7 +6029,7 @@
                 <a:solidFill>
                   <a:srgbClr val="000000"/>
                 </a:solidFill>
-                <a:latin typeface="Lucida Console" panose="020B0609040504020204" pitchFamily="49" charset="0"/>
+                <a:latin typeface="Acumin Pro" panose="020B0504020202020204" pitchFamily="34" charset="0"/>
               </a:rPr>
               <a:t>git branch {name} </a:t>
             </a:r>
@@ -6110,7 +6120,7 @@
                 <a:solidFill>
                   <a:srgbClr val="000000"/>
                 </a:solidFill>
-                <a:latin typeface="Lucida Console" panose="020B0609040504020204" pitchFamily="49" charset="0"/>
+                <a:latin typeface="Acumin Pro" panose="020B0504020202020204" pitchFamily="34" charset="0"/>
               </a:rPr>
               <a:t>git checkout {name} </a:t>
             </a:r>
@@ -6208,14 +6218,14 @@
                 <a:latin typeface="Acumin Pro" panose="020B0504020202020204" pitchFamily="34" charset="0"/>
                 <a:cs typeface="Calibri" panose="020F0502020204030204" pitchFamily="34" charset="0"/>
               </a:rPr>
-              <a:t>Use </a:t>
+              <a:t>In the future, use </a:t>
             </a:r>
             <a:r>
               <a:rPr lang="en-US" sz="800" b="0" strike="noStrike" spc="-1" dirty="0">
                 <a:solidFill>
                   <a:srgbClr val="000000"/>
                 </a:solidFill>
-                <a:latin typeface="Lucida Console" panose="020B0609040504020204" pitchFamily="49" charset="0"/>
+                <a:latin typeface="Acumin Pro" panose="020B0504020202020204" pitchFamily="34" charset="0"/>
               </a:rPr>
               <a:t>git pull {name} </a:t>
             </a:r>
@@ -6251,7 +6261,7 @@
         <p:spPr>
           <a:xfrm>
             <a:off x="5523208" y="6086598"/>
-            <a:ext cx="2227867" cy="630942"/>
+            <a:ext cx="2227867" cy="523220"/>
           </a:xfrm>
           <a:prstGeom prst="rect">
             <a:avLst/>
@@ -6285,61 +6295,145 @@
               <a:rPr lang="nl-NL" sz="700" spc="-1" dirty="0">
                 <a:latin typeface="Acumin Pro" panose="020B0504020202020204" pitchFamily="34" charset="0"/>
               </a:rPr>
-              <a:t> command uploads </a:t>
+              <a:t> command uploads the contents of </a:t>
             </a:r>
             <a:r>
               <a:rPr lang="nl-NL" sz="700" spc="-1" dirty="0" err="1">
                 <a:latin typeface="Acumin Pro" panose="020B0504020202020204" pitchFamily="34" charset="0"/>
               </a:rPr>
-              <a:t>the</a:t>
+              <a:t>your</a:t>
             </a:r>
             <a:r>
               <a:rPr lang="nl-NL" sz="700" spc="-1" dirty="0">
                 <a:latin typeface="Acumin Pro" panose="020B0504020202020204" pitchFamily="34" charset="0"/>
               </a:rPr>
-              <a:t> content of </a:t>
+              <a:t> </a:t>
             </a:r>
             <a:r>
               <a:rPr lang="nl-NL" sz="700" spc="-1" dirty="0" err="1">
                 <a:latin typeface="Acumin Pro" panose="020B0504020202020204" pitchFamily="34" charset="0"/>
               </a:rPr>
+              <a:t>local</a:t>
+            </a:r>
+            <a:r>
+              <a:rPr lang="nl-NL" sz="700" spc="-1" dirty="0">
+                <a:latin typeface="Acumin Pro" panose="020B0504020202020204" pitchFamily="34" charset="0"/>
+              </a:rPr>
+              <a:t> repository to a remote repository on </a:t>
+            </a:r>
+            <a:r>
+              <a:rPr lang="nl-NL" sz="700" spc="-1" dirty="0" err="1">
+                <a:latin typeface="Acumin Pro" panose="020B0504020202020204" pitchFamily="34" charset="0"/>
+              </a:rPr>
+              <a:t>Github</a:t>
+            </a:r>
+            <a:r>
+              <a:rPr lang="nl-NL" sz="700" spc="-1" dirty="0">
+                <a:latin typeface="Acumin Pro" panose="020B0504020202020204" pitchFamily="34" charset="0"/>
+              </a:rPr>
+              <a:t>! </a:t>
+            </a:r>
+            <a:r>
+              <a:rPr lang="nl-NL" sz="700" spc="-1" dirty="0" err="1">
+                <a:latin typeface="Acumin Pro" panose="020B0504020202020204" pitchFamily="34" charset="0"/>
+              </a:rPr>
+              <a:t>If</a:t>
+            </a:r>
+            <a:r>
+              <a:rPr lang="nl-NL" sz="700" spc="-1" dirty="0">
+                <a:latin typeface="Acumin Pro" panose="020B0504020202020204" pitchFamily="34" charset="0"/>
+              </a:rPr>
+              <a:t> </a:t>
+            </a:r>
+            <a:r>
+              <a:rPr lang="nl-NL" sz="700" spc="-1" dirty="0" err="1">
+                <a:latin typeface="Acumin Pro" panose="020B0504020202020204" pitchFamily="34" charset="0"/>
+              </a:rPr>
+              <a:t>you</a:t>
+            </a:r>
+            <a:r>
+              <a:rPr lang="nl-NL" sz="700" spc="-1" dirty="0">
+                <a:latin typeface="Acumin Pro" panose="020B0504020202020204" pitchFamily="34" charset="0"/>
+              </a:rPr>
+              <a:t> are </a:t>
+            </a:r>
+            <a:r>
+              <a:rPr lang="nl-NL" sz="700" spc="-1" dirty="0" err="1">
+                <a:latin typeface="Acumin Pro" panose="020B0504020202020204" pitchFamily="34" charset="0"/>
+              </a:rPr>
+              <a:t>working</a:t>
+            </a:r>
+            <a:r>
+              <a:rPr lang="nl-NL" sz="700" spc="-1" dirty="0">
+                <a:latin typeface="Acumin Pro" panose="020B0504020202020204" pitchFamily="34" charset="0"/>
+              </a:rPr>
+              <a:t> on a </a:t>
+            </a:r>
+            <a:r>
+              <a:rPr lang="nl-NL" sz="700" spc="-1" dirty="0" err="1">
+                <a:latin typeface="Acumin Pro" panose="020B0504020202020204" pitchFamily="34" charset="0"/>
+              </a:rPr>
+              <a:t>fork</a:t>
+            </a:r>
+            <a:r>
+              <a:rPr lang="nl-NL" sz="700" spc="-1" dirty="0">
+                <a:latin typeface="Acumin Pro" panose="020B0504020202020204" pitchFamily="34" charset="0"/>
+              </a:rPr>
+              <a:t>, </a:t>
+            </a:r>
+            <a:r>
+              <a:rPr lang="nl-NL" sz="700" spc="-1" dirty="0" err="1">
+                <a:latin typeface="Acumin Pro" panose="020B0504020202020204" pitchFamily="34" charset="0"/>
+              </a:rPr>
               <a:t>your</a:t>
             </a:r>
             <a:r>
               <a:rPr lang="nl-NL" sz="700" spc="-1" dirty="0">
                 <a:latin typeface="Acumin Pro" panose="020B0504020202020204" pitchFamily="34" charset="0"/>
               </a:rPr>
+              <a:t> team members </a:t>
+            </a:r>
+            <a:r>
+              <a:rPr lang="nl-NL" sz="700" spc="-1" dirty="0" err="1">
+                <a:latin typeface="Acumin Pro" panose="020B0504020202020204" pitchFamily="34" charset="0"/>
+              </a:rPr>
+              <a:t>won’t</a:t>
+            </a:r>
+            <a:r>
+              <a:rPr lang="nl-NL" sz="700" spc="-1" dirty="0">
+                <a:latin typeface="Acumin Pro" panose="020B0504020202020204" pitchFamily="34" charset="0"/>
+              </a:rPr>
               <a:t> </a:t>
             </a:r>
             <a:r>
               <a:rPr lang="nl-NL" sz="700" spc="-1" dirty="0" err="1">
                 <a:latin typeface="Acumin Pro" panose="020B0504020202020204" pitchFamily="34" charset="0"/>
               </a:rPr>
-              <a:t>local</a:t>
+              <a:t>be</a:t>
             </a:r>
             <a:r>
               <a:rPr lang="nl-NL" sz="700" spc="-1" dirty="0">
                 <a:latin typeface="Acumin Pro" panose="020B0504020202020204" pitchFamily="34" charset="0"/>
               </a:rPr>
-              <a:t> repository to a remote repository on GitHub. </a:t>
+              <a:t> </a:t>
             </a:r>
             <a:r>
               <a:rPr lang="nl-NL" sz="700" spc="-1" dirty="0" err="1">
                 <a:latin typeface="Acumin Pro" panose="020B0504020202020204" pitchFamily="34" charset="0"/>
               </a:rPr>
-              <a:t>Your</a:t>
+              <a:t>able</a:t>
             </a:r>
             <a:r>
               <a:rPr lang="nl-NL" sz="700" spc="-1" dirty="0">
                 <a:latin typeface="Acumin Pro" panose="020B0504020202020204" pitchFamily="34" charset="0"/>
               </a:rPr>
-              <a:t> team members </a:t>
+              <a:t> </a:t>
             </a:r>
             <a:r>
               <a:rPr lang="nl-NL" sz="700" spc="-1" dirty="0" err="1">
                 <a:latin typeface="Acumin Pro" panose="020B0504020202020204" pitchFamily="34" charset="0"/>
               </a:rPr>
-              <a:t>will</a:t>
+              <a:t>to</a:t>
             </a:r>
             <a:r>
               <a:rPr lang="nl-NL" sz="700" spc="-1" dirty="0">
@@ -6351,145 +6445,25 @@
               <a:rPr lang="nl-NL" sz="700" spc="-1" dirty="0" err="1">
                 <a:latin typeface="Acumin Pro" panose="020B0504020202020204" pitchFamily="34" charset="0"/>
               </a:rPr>
-              <a:t>likely</a:t>
+              <a:t>see</a:t>
             </a:r>
             <a:r>
               <a:rPr lang="nl-NL" sz="700" spc="-1" dirty="0">
                 <a:latin typeface="Acumin Pro" panose="020B0504020202020204" pitchFamily="34" charset="0"/>
               </a:rPr>
-              <a:t> </a:t>
+              <a:t> these changes </a:t>
             </a:r>
             <a:r>
               <a:rPr lang="nl-NL" sz="700" spc="-1" dirty="0" err="1">
                 <a:latin typeface="Acumin Pro" panose="020B0504020202020204" pitchFamily="34" charset="0"/>
               </a:rPr>
-              <a:t>not</a:t>
+              <a:t>yet</a:t>
             </a:r>
             <a:r>
               <a:rPr lang="nl-NL" sz="700" spc="-1" dirty="0">
                 <a:latin typeface="Acumin Pro" panose="020B0504020202020204" pitchFamily="34" charset="0"/>
               </a:rPr>
-              <a:t> </a:t>
-            </a:r>
-            <a:r>
-              <a:rPr lang="nl-NL" sz="700" spc="-1" dirty="0" err="1">
-                <a:latin typeface="Acumin Pro" panose="020B0504020202020204" pitchFamily="34" charset="0"/>
-              </a:rPr>
-              <a:t>see</a:t>
-            </a:r>
-            <a:r>
-              <a:rPr lang="nl-NL" sz="700" spc="-1" dirty="0">
-                <a:latin typeface="Acumin Pro" panose="020B0504020202020204" pitchFamily="34" charset="0"/>
-              </a:rPr>
-              <a:t> these changes </a:t>
-            </a:r>
-            <a:r>
-              <a:rPr lang="nl-NL" sz="700" spc="-1" dirty="0" err="1">
-                <a:latin typeface="Acumin Pro" panose="020B0504020202020204" pitchFamily="34" charset="0"/>
-              </a:rPr>
-              <a:t>yet</a:t>
-            </a:r>
-            <a:r>
-              <a:rPr lang="nl-NL" sz="700" spc="-1" dirty="0">
-                <a:latin typeface="Acumin Pro" panose="020B0504020202020204" pitchFamily="34" charset="0"/>
-              </a:rPr>
-              <a:t> (e.g., </a:t>
-            </a:r>
-            <a:r>
-              <a:rPr lang="nl-NL" sz="700" spc="-1" dirty="0" err="1">
-                <a:latin typeface="Acumin Pro" panose="020B0504020202020204" pitchFamily="34" charset="0"/>
-              </a:rPr>
-              <a:t>because</a:t>
-            </a:r>
-            <a:r>
-              <a:rPr lang="nl-NL" sz="700" spc="-1" dirty="0">
-                <a:latin typeface="Acumin Pro" panose="020B0504020202020204" pitchFamily="34" charset="0"/>
-              </a:rPr>
-              <a:t> </a:t>
-            </a:r>
-            <a:r>
-              <a:rPr lang="nl-NL" sz="700" spc="-1" dirty="0" err="1">
-                <a:latin typeface="Acumin Pro" panose="020B0504020202020204" pitchFamily="34" charset="0"/>
-              </a:rPr>
-              <a:t>they</a:t>
-            </a:r>
-            <a:r>
-              <a:rPr lang="nl-NL" sz="700" spc="-1" dirty="0">
-                <a:latin typeface="Acumin Pro" panose="020B0504020202020204" pitchFamily="34" charset="0"/>
-              </a:rPr>
-              <a:t> </a:t>
-            </a:r>
-            <a:r>
-              <a:rPr lang="nl-NL" sz="700" spc="-1" dirty="0" err="1">
-                <a:latin typeface="Acumin Pro" panose="020B0504020202020204" pitchFamily="34" charset="0"/>
-              </a:rPr>
-              <a:t>don’t</a:t>
-            </a:r>
-            <a:r>
-              <a:rPr lang="nl-NL" sz="700" spc="-1" dirty="0">
-                <a:latin typeface="Acumin Pro" panose="020B0504020202020204" pitchFamily="34" charset="0"/>
-              </a:rPr>
-              <a:t> monitor </a:t>
-            </a:r>
-            <a:r>
-              <a:rPr lang="nl-NL" sz="700" spc="-1" dirty="0" err="1">
-                <a:latin typeface="Acumin Pro" panose="020B0504020202020204" pitchFamily="34" charset="0"/>
-              </a:rPr>
-              <a:t>the</a:t>
-            </a:r>
-            <a:r>
-              <a:rPr lang="nl-NL" sz="700" spc="-1" dirty="0">
-                <a:latin typeface="Acumin Pro" panose="020B0504020202020204" pitchFamily="34" charset="0"/>
-              </a:rPr>
-              <a:t> </a:t>
-            </a:r>
-            <a:r>
-              <a:rPr lang="nl-NL" sz="700" spc="-1" dirty="0" err="1">
-                <a:latin typeface="Acumin Pro" panose="020B0504020202020204" pitchFamily="34" charset="0"/>
-              </a:rPr>
-              <a:t>branch</a:t>
-            </a:r>
-            <a:r>
-              <a:rPr lang="nl-NL" sz="700" spc="-1" dirty="0">
-                <a:latin typeface="Acumin Pro" panose="020B0504020202020204" pitchFamily="34" charset="0"/>
-              </a:rPr>
-              <a:t>, or </a:t>
-            </a:r>
-            <a:r>
-              <a:rPr lang="nl-NL" sz="700" spc="-1" dirty="0" err="1">
-                <a:latin typeface="Acumin Pro" panose="020B0504020202020204" pitchFamily="34" charset="0"/>
-              </a:rPr>
-              <a:t>because</a:t>
-            </a:r>
-            <a:r>
-              <a:rPr lang="nl-NL" sz="700" spc="-1" dirty="0">
-                <a:latin typeface="Acumin Pro" panose="020B0504020202020204" pitchFamily="34" charset="0"/>
-              </a:rPr>
-              <a:t> </a:t>
-            </a:r>
-            <a:r>
-              <a:rPr lang="nl-NL" sz="700" spc="-1" dirty="0" err="1">
-                <a:latin typeface="Acumin Pro" panose="020B0504020202020204" pitchFamily="34" charset="0"/>
-              </a:rPr>
-              <a:t>the</a:t>
-            </a:r>
-            <a:r>
-              <a:rPr lang="nl-NL" sz="700" spc="-1" dirty="0">
-                <a:latin typeface="Acumin Pro" panose="020B0504020202020204" pitchFamily="34" charset="0"/>
-              </a:rPr>
-              <a:t> changes are in a </a:t>
-            </a:r>
-            <a:r>
-              <a:rPr lang="nl-NL" sz="700" spc="-1" dirty="0" err="1">
-                <a:latin typeface="Acumin Pro" panose="020B0504020202020204" pitchFamily="34" charset="0"/>
-              </a:rPr>
-              <a:t>fork</a:t>
-            </a:r>
-            <a:r>
-              <a:rPr lang="nl-NL" sz="700" spc="-1" dirty="0">
-                <a:latin typeface="Acumin Pro" panose="020B0504020202020204" pitchFamily="34" charset="0"/>
-              </a:rPr>
-              <a:t>).</a:t>
+              <a:t>.</a:t>
             </a:r>
             <a:endParaRPr lang="nl-NL" sz="700" b="0" strike="noStrike" spc="-1" dirty="0">
               <a:latin typeface="Acumin Pro" panose="020B0504020202020204" pitchFamily="34" charset="0"/>
@@ -6689,7 +6663,7 @@
         </p:nvCxnSpPr>
         <p:spPr>
           <a:xfrm>
-            <a:off x="6222696" y="608475"/>
+            <a:off x="6222696" y="664747"/>
             <a:ext cx="547399" cy="0"/>
           </a:xfrm>
           <a:prstGeom prst="straightConnector1">
@@ -6777,7 +6751,7 @@
                 </a:solidFill>
                 <a:latin typeface="Acumin Pro" panose="020B0504020202020204" pitchFamily="34" charset="0"/>
               </a:rPr>
-              <a:t>Choose to </a:t>
+              <a:t>Next, decide on whether to </a:t>
             </a:r>
             <a:r>
               <a:rPr lang="en-US" sz="800" spc="-1" dirty="0">
@@ -6786,7 +6760,7 @@
                 </a:solidFill>
                 <a:latin typeface="Acumin Pro" panose="020B0504020202020204" pitchFamily="34" charset="0"/>
               </a:rPr>
-              <a:t>work privately (e.g., for confidential projects), or publicly (e.g., for open-source projects other can contribute to)</a:t>
+              <a:t>work privately (e.g., for confidential projects), or publicly (e.g., for open-source projects)</a:t>
             </a:r>
             <a:endParaRPr lang="nl-NL" sz="800" b="0" strike="noStrike" spc="-1" dirty="0">
               <a:latin typeface="Acumin Pro" panose="020B0504020202020204" pitchFamily="34" charset="0"/>
@@ -6810,7 +6784,7 @@
         </p:nvCxnSpPr>
         <p:spPr>
           <a:xfrm flipV="1">
-            <a:off x="8767778" y="2259997"/>
+            <a:off x="8772925" y="2171215"/>
             <a:ext cx="533348" cy="552752"/>
           </a:xfrm>
           <a:prstGeom prst="straightConnector1">
@@ -6849,14 +6823,13 @@
           </p:cNvPr>
           <p:cNvCxnSpPr>
             <a:cxnSpLocks/>
-            <a:stCxn id="44" idx="0"/>
           </p:cNvCxnSpPr>
           <p:nvPr/>
         </p:nvCxnSpPr>
         <p:spPr>
           <a:xfrm>
-            <a:off x="8925107" y="1495190"/>
-            <a:ext cx="379959" cy="202391"/>
+            <a:off x="8768055" y="1127060"/>
+            <a:ext cx="537011" cy="570521"/>
           </a:xfrm>
           <a:prstGeom prst="straightConnector1">
             <a:avLst/>
@@ -6935,23 +6908,94 @@
               </a:lnSpc>
             </a:pPr>
             <a:r>
+              <a:rPr lang="en-US" sz="800" b="1" strike="noStrike" spc="-1" dirty="0">
+                <a:solidFill>
+                  <a:srgbClr val="000000"/>
+                </a:solidFill>
+                <a:latin typeface="Acumin Pro" panose="020B0504020202020204" pitchFamily="34" charset="0"/>
+              </a:rPr>
+              <a:t> </a:t>
+            </a:r>
+            <a:r>
               <a:rPr lang="en-US" sz="800" b="0" strike="noStrike" spc="-1" dirty="0">
                 <a:solidFill>
                   <a:srgbClr val="000000"/>
                 </a:solidFill>
                 <a:latin typeface="Acumin Pro" panose="020B0504020202020204" pitchFamily="34" charset="0"/>
               </a:rPr>
-              <a:t>Go to a directory where you want the project to reside </a:t>
+              <a:t>Go to a directory </a:t>
             </a:r>
             <a:r>
               <a:rPr lang="en-US" sz="800" b="0" strike="noStrike" spc="-1" dirty="0">
                 <a:solidFill>
                   <a:srgbClr val="000000"/>
                 </a:solidFill>
-                <a:latin typeface="Acumin Pro" panose="020B0504020202020204" pitchFamily="34" charset="0"/>
-                <a:sym typeface="Wingdings" pitchFamily="2" charset="2"/>
-              </a:rPr>
-              <a:t> open terminal --&gt; run commands below (use the original repository’s username).</a:t>
+                <a:latin typeface="Wingdings" panose="05000000000000000000" pitchFamily="2" charset="2"/>
+                <a:cs typeface="Calibri" panose="020F0502020204030204" pitchFamily="34" charset="0"/>
+              </a:rPr>
+              <a:t></a:t>
+            </a:r>
+            <a:r>
+              <a:rPr lang="en-US" sz="800" b="0" strike="noStrike" spc="-1" dirty="0">
+                <a:solidFill>
+                  <a:srgbClr val="000000"/>
+                </a:solidFill>
+                <a:latin typeface="Acumin Pro" panose="020B0504020202020204" pitchFamily="34" charset="0"/>
+              </a:rPr>
+              <a:t> right click </a:t>
+            </a:r>
+            <a:r>
+              <a:rPr lang="en-US" sz="800" b="0" strike="noStrike" spc="-1" dirty="0">
+                <a:solidFill>
+                  <a:srgbClr val="000000"/>
+                </a:solidFill>
+                <a:latin typeface="Wingdings" panose="05000000000000000000" pitchFamily="2" charset="2"/>
+                <a:cs typeface="Calibri" panose="020F0502020204030204" pitchFamily="34" charset="0"/>
+              </a:rPr>
+              <a:t></a:t>
+            </a:r>
+            <a:r>
+              <a:rPr lang="en-US" sz="800" b="0" strike="noStrike" spc="-1" dirty="0">
+                <a:solidFill>
+                  <a:srgbClr val="000000"/>
+                </a:solidFill>
+                <a:latin typeface="Acumin Pro" panose="020B0504020202020204" pitchFamily="34" charset="0"/>
+              </a:rPr>
+              <a:t> “Git Bash here”. Finally, type cd {</a:t>
+            </a:r>
+            <a:r>
+              <a:rPr lang="en-US" sz="800" b="0" strike="noStrike" spc="-1" dirty="0" err="1">
+                <a:solidFill>
+                  <a:srgbClr val="000000"/>
+                </a:solidFill>
+                <a:latin typeface="Acumin Pro" panose="020B0504020202020204" pitchFamily="34" charset="0"/>
+              </a:rPr>
+              <a:t>project_name</a:t>
+            </a:r>
+            <a:r>
+              <a:rPr lang="en-US" sz="800" b="0" strike="noStrike" spc="-1" dirty="0">
+                <a:solidFill>
+                  <a:srgbClr val="000000"/>
+                </a:solidFill>
+                <a:latin typeface="Acumin Pro" panose="020B0504020202020204" pitchFamily="34" charset="0"/>
+              </a:rPr>
+              <a:t>}.</a:t>
+            </a:r>
+          </a:p>
+          <a:p>
+            <a:pPr>
+              <a:lnSpc>
+                <a:spcPct val="100000"/>
+              </a:lnSpc>
+            </a:pPr>
+            <a:r>
+              <a:rPr lang="en-US" sz="800" b="0" strike="noStrike" spc="-1" dirty="0">
+                <a:solidFill>
+                  <a:srgbClr val="000000"/>
+                </a:solidFill>
+                <a:latin typeface="Acumin Pro" panose="020B0504020202020204" pitchFamily="34" charset="0"/>
+              </a:rPr>
+              <a:t>Now, clone the repository!</a:t>
             </a:r>
             <a:endParaRPr lang="nl-NL" sz="800" b="0" strike="noStrike" spc="-1" dirty="0">
               <a:latin typeface="Acumin Pro" panose="020B0504020202020204" pitchFamily="34" charset="0"/>
@@ -6973,8 +7017,8 @@
         </p:nvSpPr>
         <p:spPr>
           <a:xfrm>
-            <a:off x="6815355" y="289913"/>
-            <a:ext cx="2125272" cy="830997"/>
+            <a:off x="6815355" y="354058"/>
+            <a:ext cx="2125272" cy="707886"/>
           </a:xfrm>
           <a:prstGeom prst="rect">
             <a:avLst/>
@@ -7001,7 +7045,7 @@
                 </a:solidFill>
                 <a:latin typeface="Acumin Pro" panose="020B0504020202020204" pitchFamily="34" charset="0"/>
               </a:rPr>
-              <a:t>3a) Team members clone (= download) </a:t>
+              <a:t>3a) Team members check out </a:t>
             </a:r>
             <a:r>
               <a:rPr lang="en-US" sz="800" b="1" u="sng" spc="-1" dirty="0">
@@ -7044,7 +7088,7 @@
                 </a:solidFill>
                 <a:latin typeface="Acumin Pro" panose="020B0504020202020204" pitchFamily="34" charset="0"/>
               </a:rPr>
-              <a:t>Go to a directory where you want the project to reside </a:t>
+              <a:t>Go to a directory </a:t>
             </a:r>
             <a:r>
               <a:rPr lang="en-US" sz="800" b="0" strike="noStrike" spc="-1" dirty="0">
@@ -7063,46 +7107,60 @@
                 </a:solidFill>
                 <a:latin typeface="Acumin Pro" panose="020B0504020202020204" pitchFamily="34" charset="0"/>
               </a:rPr>
-              <a:t> open terminal</a:t>
-            </a:r>
-            <a:r>
-              <a:rPr lang="en-US" sz="800" spc="-1" dirty="0">
-                <a:solidFill>
-                  <a:srgbClr val="000000"/>
-                </a:solidFill>
-                <a:latin typeface="Acumin Pro" panose="020B0504020202020204" pitchFamily="34" charset="0"/>
-              </a:rPr>
-              <a:t> </a:t>
-            </a:r>
-            <a:r>
-              <a:rPr lang="en-US" sz="800" spc="-1" dirty="0">
-                <a:solidFill>
-                  <a:srgbClr val="000000"/>
-                </a:solidFill>
-                <a:latin typeface="Acumin Pro" panose="020B0504020202020204" pitchFamily="34" charset="0"/>
-                <a:sym typeface="Wingdings" pitchFamily="2" charset="2"/>
-              </a:rPr>
-              <a:t> run commands below (use </a:t>
-            </a:r>
-            <a:r>
-              <a:rPr lang="en-US" sz="800" i="1" spc="-1" dirty="0">
-                <a:solidFill>
-                  <a:srgbClr val="000000"/>
-                </a:solidFill>
-                <a:latin typeface="Acumin Pro" panose="020B0504020202020204" pitchFamily="34" charset="0"/>
-                <a:sym typeface="Wingdings" pitchFamily="2" charset="2"/>
-              </a:rPr>
-              <a:t>your</a:t>
-            </a:r>
-            <a:r>
-              <a:rPr lang="en-US" sz="800" spc="-1" dirty="0">
-                <a:solidFill>
-                  <a:srgbClr val="000000"/>
-                </a:solidFill>
-                <a:latin typeface="Acumin Pro" panose="020B0504020202020204" pitchFamily="34" charset="0"/>
-                <a:sym typeface="Wingdings" pitchFamily="2" charset="2"/>
-              </a:rPr>
-              <a:t> own username to refer to the fork).</a:t>
+              <a:t> right click </a:t>
+            </a:r>
+            <a:r>
+              <a:rPr lang="en-US" sz="800" b="0" strike="noStrike" spc="-1" dirty="0">
+                <a:solidFill>
+                  <a:srgbClr val="000000"/>
+                </a:solidFill>
+                <a:latin typeface="Wingdings" panose="05000000000000000000" pitchFamily="2" charset="2"/>
+                <a:cs typeface="Calibri" panose="020F0502020204030204" pitchFamily="34" charset="0"/>
+              </a:rPr>
+              <a:t></a:t>
+            </a:r>
+            <a:r>
+              <a:rPr lang="en-US" sz="800" b="0" strike="noStrike" spc="-1" dirty="0">
+                <a:solidFill>
+                  <a:srgbClr val="000000"/>
+                </a:solidFill>
+                <a:latin typeface="Acumin Pro" panose="020B0504020202020204" pitchFamily="34" charset="0"/>
+              </a:rPr>
+              <a:t> “Git Bash here”. Finally, type cd {</a:t>
+            </a:r>
+            <a:r>
+              <a:rPr lang="en-US" sz="800" b="0" strike="noStrike" spc="-1" dirty="0" err="1">
+                <a:solidFill>
+                  <a:srgbClr val="000000"/>
+                </a:solidFill>
+                <a:latin typeface="Acumin Pro" panose="020B0504020202020204" pitchFamily="34" charset="0"/>
+              </a:rPr>
+              <a:t>project_name</a:t>
+            </a:r>
+            <a:r>
+              <a:rPr lang="en-US" sz="800" b="0" strike="noStrike" spc="-1" dirty="0">
+                <a:solidFill>
+                  <a:srgbClr val="000000"/>
+                </a:solidFill>
+                <a:latin typeface="Acumin Pro" panose="020B0504020202020204" pitchFamily="34" charset="0"/>
+              </a:rPr>
+              <a:t>}.</a:t>
+            </a:r>
+          </a:p>
+          <a:p>
+            <a:pPr>
+              <a:lnSpc>
+                <a:spcPct val="100000"/>
+              </a:lnSpc>
+            </a:pPr>
+            <a:r>
+              <a:rPr lang="en-US" sz="800" b="0" strike="noStrike" spc="-1" dirty="0">
+                <a:solidFill>
+                  <a:srgbClr val="000000"/>
+                </a:solidFill>
+                <a:latin typeface="Acumin Pro" panose="020B0504020202020204" pitchFamily="34" charset="0"/>
+              </a:rPr>
+              <a:t>Now, clone the repository!</a:t>
             </a:r>
             <a:endParaRPr lang="nl-NL" sz="800" b="0" strike="noStrike" spc="-1" dirty="0">
               <a:latin typeface="Acumin Pro" panose="020B0504020202020204" pitchFamily="34" charset="0"/>
@@ -7110,6 +7168,50 @@
           </a:p>
         </p:txBody>
       </p:sp>
+      <p:cxnSp>
+        <p:nvCxnSpPr>
+          <p:cNvPr id="127" name="Straight Arrow Connector 126">
+            <a:extLst>
+              <a:ext uri="{FF2B5EF4-FFF2-40B4-BE49-F238E27FC236}">
+                <a16:creationId xmlns:a16="http://schemas.microsoft.com/office/drawing/2014/main" id="{70524BF1-33DD-4C0E-BBBB-985C932EFEB1}"/>
+              </a:ext>
+            </a:extLst>
+          </p:cNvPr>
+          <p:cNvCxnSpPr>
+            <a:cxnSpLocks/>
+          </p:cNvCxnSpPr>
+          <p:nvPr/>
+        </p:nvCxnSpPr>
+        <p:spPr>
+          <a:xfrm>
+            <a:off x="10005421" y="2045784"/>
+            <a:ext cx="0" cy="355724"/>
+          </a:xfrm>
+          <a:prstGeom prst="straightConnector1">
+            <a:avLst/>
+          </a:prstGeom>
+          <a:ln w="38100">
+            <a:solidFill>
+              <a:srgbClr val="003366"/>
+            </a:solidFill>
+            <a:tailEnd type="triangle"/>
+          </a:ln>
+        </p:spPr>
+        <p:style>
+          <a:lnRef idx="1">
+            <a:schemeClr val="accent1"/>
+          </a:lnRef>
+          <a:fillRef idx="0">
+            <a:schemeClr val="accent1"/>
+          </a:fillRef>
+          <a:effectRef idx="0">
+            <a:schemeClr val="accent1"/>
+          </a:effectRef>
+          <a:fontRef idx="minor">
+            <a:schemeClr val="tx1"/>
+          </a:fontRef>
+        </p:style>
+      </p:cxnSp>
       <p:cxnSp>
         <p:nvCxnSpPr>
           <p:cNvPr id="129" name="Straight Arrow Connector 128">
@@ -7125,9 +7227,9 @@
           <p:nvPr/>
         </p:nvCxnSpPr>
         <p:spPr>
-          <a:xfrm>
-            <a:off x="9879270" y="2006261"/>
-            <a:ext cx="294677" cy="0"/>
+          <a:xfrm flipV="1">
+            <a:off x="10005421" y="1469436"/>
+            <a:ext cx="0" cy="367267"/>
           </a:xfrm>
           <a:prstGeom prst="straightConnector1">
             <a:avLst/>
@@ -7212,8 +7314,8 @@
         </p:nvSpPr>
         <p:spPr>
           <a:xfrm>
-            <a:off x="2674057" y="4679841"/>
-            <a:ext cx="2656338" cy="707886"/>
+            <a:off x="2674057" y="4768621"/>
+            <a:ext cx="2656338" cy="584775"/>
           </a:xfrm>
           <a:prstGeom prst="rect">
             <a:avLst/>
@@ -7256,25 +7358,7 @@
                 </a:solidFill>
                 <a:latin typeface="Acumin Pro" panose="020B0504020202020204" pitchFamily="34" charset="0"/>
               </a:rPr>
-              <a:t>Create a branch with a specific </a:t>
-            </a:r>
-            <a:r>
-              <a:rPr lang="en-US" sz="800" spc="-1" dirty="0">
-                <a:solidFill>
-                  <a:srgbClr val="000000"/>
-                </a:solidFill>
-                <a:latin typeface="Acumin Pro" panose="020B0504020202020204" pitchFamily="34" charset="0"/>
-              </a:rPr>
-              <a:t>name f</a:t>
-            </a:r>
-            <a:r>
-              <a:rPr lang="en-US" sz="800" b="0" strike="noStrike" spc="-1" dirty="0">
-                <a:solidFill>
-                  <a:srgbClr val="000000"/>
-                </a:solidFill>
-                <a:latin typeface="Acumin Pro" panose="020B0504020202020204" pitchFamily="34" charset="0"/>
-              </a:rPr>
-              <a:t>or the issue you will be working on. This helps others to review your code and avoids conflicts when pulling and pushing changes. Do this always – even if you work in a privately shared project.</a:t>
+              <a:t>Create a branch, specific for the issue you will be working on. This helps others to review your code, and avoids conflicts when pulling and pushing changes.</a:t>
             </a:r>
           </a:p>
         </p:txBody>
@@ -7337,7 +7421,7 @@
         </p:nvSpPr>
         <p:spPr>
           <a:xfrm>
-            <a:off x="4468095" y="3880099"/>
+            <a:off x="4468095" y="3968879"/>
             <a:ext cx="3847905" cy="584775"/>
           </a:xfrm>
           <a:prstGeom prst="rect">
@@ -7402,7 +7486,7 @@
                 </a:solidFill>
                 <a:latin typeface="Acumin Pro" panose="020B0504020202020204" pitchFamily="34" charset="0"/>
               </a:rPr>
-              <a:t>the files in the locally cloned repository. Working on an issue usually entails multiple commits, which can </a:t>
+              <a:t>the files in the repository. Working on an issue usually entails multiple commits, which can </a:t>
             </a:r>
             <a:r>
               <a:rPr lang="en-US" sz="800" b="0" strike="noStrike" spc="-1" dirty="0">
@@ -7429,32 +7513,8 @@
                 </a:solidFill>
                 <a:latin typeface="Acumin Pro" panose="020B0504020202020204" pitchFamily="34" charset="0"/>
               </a:rPr>
-              <a:t>editors such as </a:t>
-            </a:r>
-            <a:r>
-              <a:rPr lang="en-US" sz="800" b="0" strike="noStrike" spc="-1" dirty="0" err="1">
-                <a:solidFill>
-                  <a:srgbClr val="000000"/>
-                </a:solidFill>
-                <a:latin typeface="Acumin Pro" panose="020B0504020202020204" pitchFamily="34" charset="0"/>
-              </a:rPr>
-              <a:t>Rstudio</a:t>
-            </a:r>
-            <a:r>
-              <a:rPr lang="en-US" sz="800" spc="-1" dirty="0">
-                <a:solidFill>
-                  <a:srgbClr val="000000"/>
-                </a:solidFill>
-                <a:latin typeface="Acumin Pro" panose="020B0504020202020204" pitchFamily="34" charset="0"/>
-              </a:rPr>
-              <a:t> or Visual Studio Code.</a:t>
-            </a:r>
-            <a:endParaRPr lang="en-US" sz="800" b="0" strike="noStrike" spc="-1" dirty="0">
-              <a:solidFill>
-                <a:srgbClr val="000000"/>
-              </a:solidFill>
-              <a:latin typeface="Acumin Pro" panose="020B0504020202020204" pitchFamily="34" charset="0"/>
-            </a:endParaRPr>
+              <a:t>editors such as RStudio.</a:t>
+            </a:r>
           </a:p>
         </p:txBody>
       </p:sp>
@@ -7568,7 +7628,7 @@
                 </a:solidFill>
                 <a:latin typeface="Acumin Pro" panose="020B0504020202020204" pitchFamily="34" charset="0"/>
               </a:rPr>
-              <a:t> (i.e., select one from the issues or project page)</a:t>
+              <a:t> (i.e., select one from the Issues or Project page)</a:t>
             </a:r>
           </a:p>
           <a:p>
@@ -7615,16 +7675,25 @@
                 </a:solidFill>
                 <a:latin typeface="Acumin Pro" panose="020B0504020202020204" pitchFamily="34" charset="0"/>
               </a:rPr>
-              <a:t> </a:t>
-            </a:r>
-            <a:r>
-              <a:rPr lang="en-US" sz="800" spc="-1" dirty="0">
-                <a:solidFill>
-                  <a:srgbClr val="000000"/>
-                </a:solidFill>
-                <a:latin typeface="Acumin Pro" panose="020B0504020202020204" pitchFamily="34" charset="0"/>
-              </a:rPr>
-              <a:t>(2a above) - check </a:t>
+              <a:t> – check if fork is up-to-date using </a:t>
+            </a:r>
+            <a:r>
+              <a:rPr lang="en-US" sz="800" u="sng" spc="-1" dirty="0">
+                <a:solidFill>
+                  <a:srgbClr val="000000"/>
+                </a:solidFill>
+                <a:latin typeface="Acumin Pro" panose="020B0504020202020204" pitchFamily="34" charset="0"/>
+              </a:rPr>
+              <a:t>s</a:t>
+            </a:r>
+            <a:r>
+              <a:rPr lang="en-US" sz="800" b="0" u="sng" strike="noStrike" spc="-1" dirty="0">
+                <a:solidFill>
+                  <a:srgbClr val="000000"/>
+                </a:solidFill>
+                <a:latin typeface="Acumin Pro" panose="020B0504020202020204" pitchFamily="34" charset="0"/>
+              </a:rPr>
+              <a:t>ync fork</a:t>
             </a:r>
             <a:r>
               <a:rPr lang="en-US" sz="800" b="0" strike="noStrike" spc="-1" dirty="0">
@@ -7633,33 +7702,6 @@
                 </a:solidFill>
                 <a:latin typeface="Acumin Pro" panose="020B0504020202020204" pitchFamily="34" charset="0"/>
               </a:rPr>
-              <a:t>if fork is up-to-date using </a:t>
-            </a:r>
-            <a:r>
-              <a:rPr lang="en-US" sz="800" u="sng" spc="-1" dirty="0">
-                <a:solidFill>
-                  <a:srgbClr val="000000"/>
-                </a:solidFill>
-                <a:latin typeface="Acumin Pro" panose="020B0504020202020204" pitchFamily="34" charset="0"/>
-              </a:rPr>
-              <a:t>s</a:t>
-            </a:r>
-            <a:r>
-              <a:rPr lang="en-US" sz="800" b="0" u="sng" strike="noStrike" spc="-1" dirty="0">
-                <a:solidFill>
-                  <a:srgbClr val="000000"/>
-                </a:solidFill>
-                <a:latin typeface="Acumin Pro" panose="020B0504020202020204" pitchFamily="34" charset="0"/>
-              </a:rPr>
-              <a:t>ync fork</a:t>
-            </a:r>
-            <a:r>
-              <a:rPr lang="en-US" sz="800" b="0" strike="noStrike" spc="-1" dirty="0">
-                <a:solidFill>
-                  <a:srgbClr val="000000"/>
-                </a:solidFill>
-                <a:latin typeface="Acumin Pro" panose="020B0504020202020204" pitchFamily="34" charset="0"/>
-              </a:rPr>
               <a:t> on </a:t>
             </a:r>
             <a:r>
@@ -7669,7 +7711,7 @@
                 </a:solidFill>
                 <a:latin typeface="Acumin Pro" panose="020B0504020202020204" pitchFamily="34" charset="0"/>
               </a:rPr>
-              <a:t>GitHub.com</a:t>
+              <a:t>Github.com</a:t>
             </a:r>
             <a:r>
               <a:rPr lang="en-US" sz="800" spc="-1" dirty="0">
@@ -7751,7 +7793,7 @@
         </p:nvGrpSpPr>
         <p:grpSpPr>
           <a:xfrm>
-            <a:off x="7335963" y="1198391"/>
+            <a:off x="7335963" y="1057711"/>
             <a:ext cx="1589144" cy="644060"/>
             <a:chOff x="8026444" y="1082658"/>
             <a:chExt cx="1589144" cy="644060"/>
@@ -7860,7 +7902,7 @@
                 </a:lnSpc>
               </a:pPr>
               <a:r>
-                <a:rPr lang="en-US" sz="700" b="1" strike="noStrike" spc="-1" dirty="0">
+                <a:rPr lang="en-US" sz="700" b="0" strike="noStrike" spc="-1" dirty="0">
                   <a:solidFill>
                     <a:srgbClr val="000000"/>
                   </a:solidFill>
@@ -7869,7 +7911,7 @@
                 </a:rPr>
                 <a:t>git clone [your url]</a:t>
               </a:r>
-              <a:endParaRPr lang="nl-NL" sz="700" b="1" strike="noStrike" spc="-1" dirty="0">
+              <a:endParaRPr lang="nl-NL" sz="700" b="0" strike="noStrike" spc="-1" dirty="0">
                 <a:latin typeface="Roboto Mono Light" panose="00000009000000000000" pitchFamily="49" charset="0"/>
                 <a:ea typeface="Roboto Mono Light" panose="00000009000000000000" pitchFamily="49" charset="0"/>
               </a:endParaRPr>
@@ -8140,7 +8182,7 @@
         </p:nvCxnSpPr>
         <p:spPr>
           <a:xfrm>
-            <a:off x="10356677" y="4606854"/>
+            <a:off x="10416507" y="5042352"/>
             <a:ext cx="0" cy="293114"/>
           </a:xfrm>
           <a:prstGeom prst="straightConnector1">
@@ -8183,7 +8225,7 @@
         <p:spPr>
           <a:xfrm>
             <a:off x="9031465" y="3984518"/>
-            <a:ext cx="2792340" cy="583321"/>
+            <a:ext cx="2792340" cy="1075764"/>
           </a:xfrm>
           <a:prstGeom prst="rect">
             <a:avLst/>
@@ -8270,8 +8312,40 @@
                 </a:solidFill>
                 <a:latin typeface="Acumin Pro" panose="020B0504020202020204" pitchFamily="34" charset="0"/>
               </a:rPr>
-              <a:t>/write/issues.</a:t>
-            </a:r>
+              <a:t>/write/issues!</a:t>
+            </a:r>
+          </a:p>
+          <a:p>
+            <a:pPr>
+              <a:lnSpc>
+                <a:spcPct val="100000"/>
+              </a:lnSpc>
+            </a:pPr>
+            <a:endParaRPr lang="en-US" sz="800" spc="-1" dirty="0">
+              <a:solidFill>
+                <a:srgbClr val="000000"/>
+              </a:solidFill>
+              <a:latin typeface="Acumin Pro" panose="020B0504020202020204" pitchFamily="34" charset="0"/>
+            </a:endParaRPr>
+          </a:p>
+          <a:p>
+            <a:pPr>
+              <a:lnSpc>
+                <a:spcPct val="100000"/>
+              </a:lnSpc>
+            </a:pPr>
+            <a:r>
+              <a:rPr lang="en-US" sz="800" spc="-1" dirty="0">
+                <a:solidFill>
+                  <a:srgbClr val="000000"/>
+                </a:solidFill>
+                <a:latin typeface="Acumin Pro" panose="020B0504020202020204" pitchFamily="34" charset="0"/>
+              </a:rPr>
+              <a:t>If you worked on a forked repository, follow step 5A above to contribute your changes to the main repository.</a:t>
+            </a:r>
+            <a:endParaRPr lang="nl-NL" sz="800" b="0" strike="noStrike" spc="-1" dirty="0">
+              <a:latin typeface="Acumin Pro" panose="020B0504020202020204" pitchFamily="34" charset="0"/>
+            </a:endParaRPr>
           </a:p>
         </p:txBody>
       </p:sp>
@@ -8289,8 +8363,8 @@
         </p:nvSpPr>
         <p:spPr>
           <a:xfrm>
-            <a:off x="9009211" y="4915120"/>
-            <a:ext cx="2814594" cy="1198875"/>
+            <a:off x="9009210" y="5336160"/>
+            <a:ext cx="2814594" cy="952653"/>
           </a:xfrm>
           <a:prstGeom prst="rect">
             <a:avLst/>
@@ -8363,62 +8437,14 @@
                 </a:solidFill>
                 <a:latin typeface="Acumin Pro" panose="020B0504020202020204" pitchFamily="34" charset="0"/>
               </a:rPr>
-              <a:t>Happy with the changes, and ready to ask team members to integrate these changes with the main branch of your (original) repository? Make a pull request. </a:t>
-            </a:r>
-            <a:r>
-              <a:rPr lang="en-US" sz="800" b="0" strike="noStrike" spc="-1" dirty="0">
-                <a:solidFill>
-                  <a:srgbClr val="000000"/>
-                </a:solidFill>
-                <a:latin typeface="Acumin Pro" panose="020B0504020202020204" pitchFamily="34" charset="0"/>
-              </a:rPr>
-              <a:t>See </a:t>
-            </a:r>
-            <a:r>
-              <a:rPr lang="en-US" sz="800" spc="-1" dirty="0" err="1">
-                <a:solidFill>
-                  <a:srgbClr val="000000"/>
-                </a:solidFill>
-                <a:latin typeface="Acumin Pro" panose="020B0504020202020204" pitchFamily="34" charset="0"/>
-              </a:rPr>
-              <a:t>tilburgsciencehub.com</a:t>
-            </a:r>
-            <a:r>
-              <a:rPr lang="en-US" sz="800" spc="-1" dirty="0">
-                <a:solidFill>
-                  <a:srgbClr val="000000"/>
-                </a:solidFill>
-                <a:latin typeface="Acumin Pro" panose="020B0504020202020204" pitchFamily="34" charset="0"/>
-              </a:rPr>
-              <a:t>/contribute/</a:t>
-            </a:r>
-            <a:r>
-              <a:rPr lang="en-US" sz="800" spc="-1" dirty="0" err="1">
-                <a:solidFill>
-                  <a:srgbClr val="000000"/>
-                </a:solidFill>
-                <a:latin typeface="Acumin Pro" panose="020B0504020202020204" pitchFamily="34" charset="0"/>
-              </a:rPr>
-              <a:t>pullrequests</a:t>
-            </a:r>
-            <a:r>
-              <a:rPr lang="en-US" sz="800" spc="-1" dirty="0">
-                <a:solidFill>
-                  <a:srgbClr val="000000"/>
-                </a:solidFill>
-                <a:latin typeface="Acumin Pro" panose="020B0504020202020204" pitchFamily="34" charset="0"/>
-              </a:rPr>
-              <a:t> </a:t>
-            </a:r>
-            <a:r>
-              <a:rPr lang="en-US" sz="800" b="0" strike="noStrike" spc="-1" dirty="0">
-                <a:solidFill>
-                  <a:srgbClr val="000000"/>
-                </a:solidFill>
-                <a:latin typeface="Acumin Pro" panose="020B0504020202020204" pitchFamily="34" charset="0"/>
-              </a:rPr>
-              <a:t>to find out how.</a:t>
-            </a:r>
+              <a:t>Happy with your changes and ready to ask team members to integrate them with your main project? Make a pull request! </a:t>
+            </a:r>
+            <a:endParaRPr lang="en-US" sz="800" strike="noStrike" spc="-1" dirty="0">
+              <a:solidFill>
+                <a:srgbClr val="000000"/>
+              </a:solidFill>
+              <a:latin typeface="Acumin Pro" panose="020B0504020202020204" pitchFamily="34" charset="0"/>
+            </a:endParaRPr>
           </a:p>
           <a:p>
             <a:pPr>
@@ -8426,7 +8452,7 @@
                 <a:spcPct val="100000"/>
               </a:lnSpc>
             </a:pPr>
-            <a:endParaRPr lang="en-US" sz="800" spc="-1" dirty="0">
+            <a:endParaRPr lang="en-US" sz="800" strike="noStrike" spc="-1" dirty="0">
               <a:solidFill>
                 <a:srgbClr val="000000"/>
               </a:solidFill>
@@ -8440,77 +8466,62 @@
               </a:lnSpc>
             </a:pPr>
             <a:r>
-              <a:rPr lang="nl-NL" sz="800" b="0" strike="noStrike" spc="-1" dirty="0" err="1">
-                <a:latin typeface="Acumin Pro" panose="020B0504020202020204" pitchFamily="34" charset="0"/>
-              </a:rPr>
-              <a:t>Your</a:t>
-            </a:r>
-            <a:r>
-              <a:rPr lang="nl-NL" sz="800" b="0" strike="noStrike" spc="-1" dirty="0">
-                <a:latin typeface="Acumin Pro" panose="020B0504020202020204" pitchFamily="34" charset="0"/>
-              </a:rPr>
-              <a:t> team members </a:t>
-            </a:r>
-            <a:r>
-              <a:rPr lang="nl-NL" sz="800" b="0" strike="noStrike" spc="-1" dirty="0" err="1">
-                <a:latin typeface="Acumin Pro" panose="020B0504020202020204" pitchFamily="34" charset="0"/>
-              </a:rPr>
-              <a:t>now</a:t>
-            </a:r>
-            <a:r>
-              <a:rPr lang="nl-NL" sz="800" b="0" strike="noStrike" spc="-1" dirty="0">
+              <a:rPr lang="en-US" sz="800" b="0" strike="noStrike" spc="-1" dirty="0">
+                <a:solidFill>
+                  <a:srgbClr val="000000"/>
+                </a:solidFill>
+                <a:latin typeface="Acumin Pro" panose="020B0504020202020204" pitchFamily="34" charset="0"/>
+              </a:rPr>
+              <a:t>See </a:t>
+            </a:r>
+            <a:r>
+              <a:rPr lang="en-US" sz="800" spc="-1" dirty="0" err="1">
+                <a:solidFill>
+                  <a:srgbClr val="000000"/>
+                </a:solidFill>
+                <a:latin typeface="Acumin Pro" panose="020B0504020202020204" pitchFamily="34" charset="0"/>
+              </a:rPr>
+              <a:t>tilburgsciencehub.com</a:t>
+            </a:r>
+            <a:r>
+              <a:rPr lang="en-US" sz="800" spc="-1" dirty="0">
+                <a:solidFill>
+                  <a:srgbClr val="000000"/>
+                </a:solidFill>
+                <a:latin typeface="Acumin Pro" panose="020B0504020202020204" pitchFamily="34" charset="0"/>
+              </a:rPr>
+              <a:t>/contribute/</a:t>
+            </a:r>
+            <a:r>
+              <a:rPr lang="en-US" sz="800" spc="-1" dirty="0" err="1">
+                <a:solidFill>
+                  <a:srgbClr val="000000"/>
+                </a:solidFill>
+                <a:latin typeface="Acumin Pro" panose="020B0504020202020204" pitchFamily="34" charset="0"/>
+              </a:rPr>
+              <a:t>pullrequests</a:t>
+            </a:r>
+            <a:r>
+              <a:rPr lang="en-US" sz="800" spc="-1" dirty="0">
+                <a:solidFill>
+                  <a:srgbClr val="000000"/>
+                </a:solidFill>
                 <a:latin typeface="Acumin Pro" panose="020B0504020202020204" pitchFamily="34" charset="0"/>
               </a:rPr>
               <a:t> </a:t>
             </a:r>
             <a:r>
-              <a:rPr lang="nl-NL" sz="800" b="0" strike="noStrike" spc="-1" dirty="0" err="1">
-                <a:latin typeface="Acumin Pro" panose="020B0504020202020204" pitchFamily="34" charset="0"/>
-              </a:rPr>
-              <a:t>can</a:t>
-            </a:r>
-            <a:r>
-              <a:rPr lang="nl-NL" sz="800" b="0" strike="noStrike" spc="-1" dirty="0">
-                <a:latin typeface="Acumin Pro" panose="020B0504020202020204" pitchFamily="34" charset="0"/>
-              </a:rPr>
-              <a:t> review </a:t>
-            </a:r>
-            <a:r>
-              <a:rPr lang="nl-NL" sz="800" b="0" strike="noStrike" spc="-1" dirty="0" err="1">
-                <a:latin typeface="Acumin Pro" panose="020B0504020202020204" pitchFamily="34" charset="0"/>
-              </a:rPr>
-              <a:t>and</a:t>
-            </a:r>
-            <a:r>
-              <a:rPr lang="nl-NL" sz="800" b="0" strike="noStrike" spc="-1" dirty="0">
-                <a:latin typeface="Acumin Pro" panose="020B0504020202020204" pitchFamily="34" charset="0"/>
-              </a:rPr>
-              <a:t> </a:t>
-            </a:r>
-            <a:r>
-              <a:rPr lang="nl-NL" sz="800" b="0" strike="noStrike" spc="-1" dirty="0" err="1">
-                <a:latin typeface="Acumin Pro" panose="020B0504020202020204" pitchFamily="34" charset="0"/>
-              </a:rPr>
-              <a:t>integrate</a:t>
-            </a:r>
-            <a:r>
-              <a:rPr lang="nl-NL" sz="800" b="0" strike="noStrike" spc="-1" dirty="0">
-                <a:latin typeface="Acumin Pro" panose="020B0504020202020204" pitchFamily="34" charset="0"/>
-              </a:rPr>
-              <a:t> </a:t>
-            </a:r>
-            <a:r>
-              <a:rPr lang="nl-NL" sz="800" b="0" strike="noStrike" spc="-1" dirty="0" err="1">
-                <a:latin typeface="Acumin Pro" panose="020B0504020202020204" pitchFamily="34" charset="0"/>
-              </a:rPr>
-              <a:t>your</a:t>
-            </a:r>
-            <a:r>
-              <a:rPr lang="nl-NL" sz="800" b="0" strike="noStrike" spc="-1" dirty="0">
-                <a:latin typeface="Acumin Pro" panose="020B0504020202020204" pitchFamily="34" charset="0"/>
-              </a:rPr>
-              <a:t> changes.</a:t>
-            </a:r>
+              <a:rPr lang="en-US" sz="800" b="0" strike="noStrike" spc="-1" dirty="0">
+                <a:solidFill>
+                  <a:srgbClr val="000000"/>
+                </a:solidFill>
+                <a:latin typeface="Acumin Pro" panose="020B0504020202020204" pitchFamily="34" charset="0"/>
+              </a:rPr>
+              <a:t>to find out how to perform pull requests!</a:t>
+            </a:r>
+            <a:endParaRPr lang="nl-NL" sz="800" b="0" strike="noStrike" spc="-1" dirty="0">
+              <a:latin typeface="Acumin Pro" panose="020B0504020202020204" pitchFamily="34" charset="0"/>
+            </a:endParaRPr>
           </a:p>
         </p:txBody>
       </p:sp>
@@ -8522,8 +8533,8 @@
         </p:nvSpPr>
         <p:spPr>
           <a:xfrm>
-            <a:off x="8946344" y="1752971"/>
-            <a:ext cx="924834" cy="460211"/>
+            <a:off x="8946343" y="1752971"/>
+            <a:ext cx="1497893" cy="337100"/>
           </a:xfrm>
           <a:prstGeom prst="rect">
             <a:avLst/>
@@ -8574,28 +8585,16 @@
                 </a:solidFill>
                 <a:latin typeface="Acumin Pro" panose="020B0504020202020204" pitchFamily="34" charset="0"/>
               </a:rPr>
-              <a:t>Follow</a:t>
-            </a:r>
-          </a:p>
-          <a:p>
-            <a:pPr>
-              <a:lnSpc>
-                <a:spcPct val="100000"/>
-              </a:lnSpc>
-            </a:pPr>
-            <a:endParaRPr lang="en-US" sz="800" spc="-1" dirty="0">
-              <a:solidFill>
-                <a:srgbClr val="000000"/>
-              </a:solidFill>
-              <a:latin typeface="Acumin Pro" panose="020B0504020202020204" pitchFamily="34" charset="0"/>
-            </a:endParaRPr>
-          </a:p>
-          <a:p>
-            <a:pPr>
-              <a:lnSpc>
-                <a:spcPct val="100000"/>
-              </a:lnSpc>
-            </a:pPr>
+              <a:t>Follow the Git Workflow</a:t>
+            </a:r>
+            <a:br>
+              <a:rPr lang="en-US" sz="800" spc="-1" dirty="0">
+                <a:solidFill>
+                  <a:srgbClr val="000000"/>
+                </a:solidFill>
+                <a:latin typeface="Acumin Pro" panose="020B0504020202020204" pitchFamily="34" charset="0"/>
+              </a:rPr>
+            </a:br>
             <a:r>
               <a:rPr lang="en-US" sz="800" spc="-1" dirty="0">
                 <a:solidFill>
@@ -8625,8 +8624,8 @@
         </p:nvSpPr>
         <p:spPr>
           <a:xfrm>
-            <a:off x="9034166" y="1927498"/>
-            <a:ext cx="780555" cy="123111"/>
+            <a:off x="9476921" y="1794513"/>
+            <a:ext cx="886272" cy="123111"/>
           </a:xfrm>
           <a:prstGeom prst="rect">
             <a:avLst/>

</xml_diff>